<commit_message>
method: vdp half done.
</commit_message>
<xml_diff>
--- a/figs_misc/sketches.pptx
+++ b/figs_misc/sketches.pptx
@@ -8,6 +8,8 @@
     <p:sldId id="258" r:id="rId2"/>
     <p:sldId id="256" r:id="rId3"/>
     <p:sldId id="257" r:id="rId4"/>
+    <p:sldId id="259" r:id="rId5"/>
+    <p:sldId id="260" r:id="rId6"/>
   </p:sldIdLst>
   <p:sldSz cx="9144000" cy="6858000" type="screen4x3"/>
   <p:notesSz cx="6858000" cy="9144000"/>
@@ -245,7 +247,7 @@
           <a:p>
             <a:fld id="{F098EB72-31E7-4F23-B191-5ED9A68FC274}" type="datetimeFigureOut">
               <a:rPr lang="en-US" smtClean="0"/>
-              <a:t>10/15/2018</a:t>
+              <a:t>10/25/2018</a:t>
             </a:fld>
             <a:endParaRPr lang="en-US"/>
           </a:p>
@@ -415,7 +417,7 @@
           <a:p>
             <a:fld id="{F098EB72-31E7-4F23-B191-5ED9A68FC274}" type="datetimeFigureOut">
               <a:rPr lang="en-US" smtClean="0"/>
-              <a:t>10/15/2018</a:t>
+              <a:t>10/25/2018</a:t>
             </a:fld>
             <a:endParaRPr lang="en-US"/>
           </a:p>
@@ -595,7 +597,7 @@
           <a:p>
             <a:fld id="{F098EB72-31E7-4F23-B191-5ED9A68FC274}" type="datetimeFigureOut">
               <a:rPr lang="en-US" smtClean="0"/>
-              <a:t>10/15/2018</a:t>
+              <a:t>10/25/2018</a:t>
             </a:fld>
             <a:endParaRPr lang="en-US"/>
           </a:p>
@@ -765,7 +767,7 @@
           <a:p>
             <a:fld id="{F098EB72-31E7-4F23-B191-5ED9A68FC274}" type="datetimeFigureOut">
               <a:rPr lang="en-US" smtClean="0"/>
-              <a:t>10/15/2018</a:t>
+              <a:t>10/25/2018</a:t>
             </a:fld>
             <a:endParaRPr lang="en-US"/>
           </a:p>
@@ -1009,7 +1011,7 @@
           <a:p>
             <a:fld id="{F098EB72-31E7-4F23-B191-5ED9A68FC274}" type="datetimeFigureOut">
               <a:rPr lang="en-US" smtClean="0"/>
-              <a:t>10/15/2018</a:t>
+              <a:t>10/25/2018</a:t>
             </a:fld>
             <a:endParaRPr lang="en-US"/>
           </a:p>
@@ -1241,7 +1243,7 @@
           <a:p>
             <a:fld id="{F098EB72-31E7-4F23-B191-5ED9A68FC274}" type="datetimeFigureOut">
               <a:rPr lang="en-US" smtClean="0"/>
-              <a:t>10/15/2018</a:t>
+              <a:t>10/25/2018</a:t>
             </a:fld>
             <a:endParaRPr lang="en-US"/>
           </a:p>
@@ -1608,7 +1610,7 @@
           <a:p>
             <a:fld id="{F098EB72-31E7-4F23-B191-5ED9A68FC274}" type="datetimeFigureOut">
               <a:rPr lang="en-US" smtClean="0"/>
-              <a:t>10/15/2018</a:t>
+              <a:t>10/25/2018</a:t>
             </a:fld>
             <a:endParaRPr lang="en-US"/>
           </a:p>
@@ -1726,7 +1728,7 @@
           <a:p>
             <a:fld id="{F098EB72-31E7-4F23-B191-5ED9A68FC274}" type="datetimeFigureOut">
               <a:rPr lang="en-US" smtClean="0"/>
-              <a:t>10/15/2018</a:t>
+              <a:t>10/25/2018</a:t>
             </a:fld>
             <a:endParaRPr lang="en-US"/>
           </a:p>
@@ -1821,7 +1823,7 @@
           <a:p>
             <a:fld id="{F098EB72-31E7-4F23-B191-5ED9A68FC274}" type="datetimeFigureOut">
               <a:rPr lang="en-US" smtClean="0"/>
-              <a:t>10/15/2018</a:t>
+              <a:t>10/25/2018</a:t>
             </a:fld>
             <a:endParaRPr lang="en-US"/>
           </a:p>
@@ -2098,7 +2100,7 @@
           <a:p>
             <a:fld id="{F098EB72-31E7-4F23-B191-5ED9A68FC274}" type="datetimeFigureOut">
               <a:rPr lang="en-US" smtClean="0"/>
-              <a:t>10/15/2018</a:t>
+              <a:t>10/25/2018</a:t>
             </a:fld>
             <a:endParaRPr lang="en-US"/>
           </a:p>
@@ -2355,7 +2357,7 @@
           <a:p>
             <a:fld id="{F098EB72-31E7-4F23-B191-5ED9A68FC274}" type="datetimeFigureOut">
               <a:rPr lang="en-US" smtClean="0"/>
-              <a:t>10/15/2018</a:t>
+              <a:t>10/25/2018</a:t>
             </a:fld>
             <a:endParaRPr lang="en-US"/>
           </a:p>
@@ -2568,7 +2570,7 @@
           <a:p>
             <a:fld id="{F098EB72-31E7-4F23-B191-5ED9A68FC274}" type="datetimeFigureOut">
               <a:rPr lang="en-US" smtClean="0"/>
-              <a:t>10/15/2018</a:t>
+              <a:t>10/25/2018</a:t>
             </a:fld>
             <a:endParaRPr lang="en-US"/>
           </a:p>
@@ -5367,6 +5369,2732 @@
 </p:sld>
 </file>
 
+<file path=ppt/slides/slide4.xml><?xml version="1.0" encoding="utf-8"?>
+<p:sld xmlns:a="http://schemas.openxmlformats.org/drawingml/2006/main" xmlns:r="http://schemas.openxmlformats.org/officeDocument/2006/relationships" xmlns:p="http://schemas.openxmlformats.org/presentationml/2006/main">
+  <p:cSld>
+    <p:spTree>
+      <p:nvGrpSpPr>
+        <p:cNvPr id="1" name=""/>
+        <p:cNvGrpSpPr/>
+        <p:nvPr/>
+      </p:nvGrpSpPr>
+      <p:grpSpPr>
+        <a:xfrm>
+          <a:off x="0" y="0"/>
+          <a:ext cx="0" cy="0"/>
+          <a:chOff x="0" y="0"/>
+          <a:chExt cx="0" cy="0"/>
+        </a:xfrm>
+      </p:grpSpPr>
+      <p:sp>
+        <p:nvSpPr>
+          <p:cNvPr id="2" name="Rectangle 1">
+            <a:extLst>
+              <a:ext uri="{FF2B5EF4-FFF2-40B4-BE49-F238E27FC236}">
+                <a16:creationId xmlns:a16="http://schemas.microsoft.com/office/drawing/2014/main" id="{34DD6991-1984-4AD1-94E6-42504DF519AF}"/>
+              </a:ext>
+            </a:extLst>
+          </p:cNvPr>
+          <p:cNvSpPr/>
+          <p:nvPr/>
+        </p:nvSpPr>
+        <p:spPr>
+          <a:xfrm>
+            <a:off x="1550504" y="2729948"/>
+            <a:ext cx="6480313" cy="1219200"/>
+          </a:xfrm>
+          <a:prstGeom prst="rect">
+            <a:avLst/>
+          </a:prstGeom>
+          <a:solidFill>
+            <a:srgbClr val="2671B2"/>
+          </a:solidFill>
+          <a:ln>
+            <a:noFill/>
+          </a:ln>
+        </p:spPr>
+        <p:style>
+          <a:lnRef idx="2">
+            <a:schemeClr val="accent1">
+              <a:shade val="50000"/>
+            </a:schemeClr>
+          </a:lnRef>
+          <a:fillRef idx="1">
+            <a:schemeClr val="accent1"/>
+          </a:fillRef>
+          <a:effectRef idx="0">
+            <a:schemeClr val="accent1"/>
+          </a:effectRef>
+          <a:fontRef idx="minor">
+            <a:schemeClr val="lt1"/>
+          </a:fontRef>
+        </p:style>
+        <p:txBody>
+          <a:bodyPr rtlCol="0" anchor="ctr"/>
+          <a:lstStyle/>
+          <a:p>
+            <a:pPr algn="ctr"/>
+            <a:r>
+              <a:rPr lang="en-GB" sz="3200" dirty="0"/>
+              <a:t>sample</a:t>
+            </a:r>
+            <a:endParaRPr lang="en-US" sz="3200" dirty="0"/>
+          </a:p>
+        </p:txBody>
+      </p:sp>
+      <p:sp>
+        <p:nvSpPr>
+          <p:cNvPr id="3" name="Rectangle 2">
+            <a:extLst>
+              <a:ext uri="{FF2B5EF4-FFF2-40B4-BE49-F238E27FC236}">
+                <a16:creationId xmlns:a16="http://schemas.microsoft.com/office/drawing/2014/main" id="{42AA51B8-F597-432D-9504-3822547A1D21}"/>
+              </a:ext>
+            </a:extLst>
+          </p:cNvPr>
+          <p:cNvSpPr/>
+          <p:nvPr/>
+        </p:nvSpPr>
+        <p:spPr>
+          <a:xfrm>
+            <a:off x="5910470" y="1345096"/>
+            <a:ext cx="132522" cy="3988904"/>
+          </a:xfrm>
+          <a:prstGeom prst="rect">
+            <a:avLst/>
+          </a:prstGeom>
+          <a:solidFill>
+            <a:srgbClr val="2671B2"/>
+          </a:solidFill>
+          <a:ln>
+            <a:noFill/>
+          </a:ln>
+        </p:spPr>
+        <p:style>
+          <a:lnRef idx="2">
+            <a:schemeClr val="accent1">
+              <a:shade val="50000"/>
+            </a:schemeClr>
+          </a:lnRef>
+          <a:fillRef idx="1">
+            <a:schemeClr val="accent1"/>
+          </a:fillRef>
+          <a:effectRef idx="0">
+            <a:schemeClr val="accent1"/>
+          </a:effectRef>
+          <a:fontRef idx="minor">
+            <a:schemeClr val="lt1"/>
+          </a:fontRef>
+        </p:style>
+        <p:txBody>
+          <a:bodyPr rtlCol="0" anchor="ctr"/>
+          <a:lstStyle/>
+          <a:p>
+            <a:pPr algn="ctr"/>
+            <a:endParaRPr lang="en-US"/>
+          </a:p>
+        </p:txBody>
+      </p:sp>
+      <p:sp>
+        <p:nvSpPr>
+          <p:cNvPr id="4" name="Rectangle 3">
+            <a:extLst>
+              <a:ext uri="{FF2B5EF4-FFF2-40B4-BE49-F238E27FC236}">
+                <a16:creationId xmlns:a16="http://schemas.microsoft.com/office/drawing/2014/main" id="{95D045F8-F188-4570-8869-1B8EA5FF8E68}"/>
+              </a:ext>
+            </a:extLst>
+          </p:cNvPr>
+          <p:cNvSpPr/>
+          <p:nvPr/>
+        </p:nvSpPr>
+        <p:spPr>
+          <a:xfrm>
+            <a:off x="3531704" y="1345096"/>
+            <a:ext cx="132522" cy="3988904"/>
+          </a:xfrm>
+          <a:prstGeom prst="rect">
+            <a:avLst/>
+          </a:prstGeom>
+          <a:solidFill>
+            <a:srgbClr val="2671B2"/>
+          </a:solidFill>
+          <a:ln>
+            <a:noFill/>
+          </a:ln>
+        </p:spPr>
+        <p:style>
+          <a:lnRef idx="2">
+            <a:schemeClr val="accent1">
+              <a:shade val="50000"/>
+            </a:schemeClr>
+          </a:lnRef>
+          <a:fillRef idx="1">
+            <a:schemeClr val="accent1"/>
+          </a:fillRef>
+          <a:effectRef idx="0">
+            <a:schemeClr val="accent1"/>
+          </a:effectRef>
+          <a:fontRef idx="minor">
+            <a:schemeClr val="lt1"/>
+          </a:fontRef>
+        </p:style>
+        <p:txBody>
+          <a:bodyPr rtlCol="0" anchor="ctr"/>
+          <a:lstStyle/>
+          <a:p>
+            <a:pPr algn="ctr"/>
+            <a:endParaRPr lang="en-US"/>
+          </a:p>
+        </p:txBody>
+      </p:sp>
+      <p:sp>
+        <p:nvSpPr>
+          <p:cNvPr id="5" name="Rectangle 4">
+            <a:extLst>
+              <a:ext uri="{FF2B5EF4-FFF2-40B4-BE49-F238E27FC236}">
+                <a16:creationId xmlns:a16="http://schemas.microsoft.com/office/drawing/2014/main" id="{5CD81D5E-4DBE-4705-A8A3-556B0784C6B0}"/>
+              </a:ext>
+            </a:extLst>
+          </p:cNvPr>
+          <p:cNvSpPr/>
+          <p:nvPr/>
+        </p:nvSpPr>
+        <p:spPr>
+          <a:xfrm>
+            <a:off x="3392556" y="1096618"/>
+            <a:ext cx="410818" cy="397565"/>
+          </a:xfrm>
+          <a:prstGeom prst="rect">
+            <a:avLst/>
+          </a:prstGeom>
+          <a:solidFill>
+            <a:srgbClr val="EA621F"/>
+          </a:solidFill>
+          <a:ln>
+            <a:noFill/>
+          </a:ln>
+        </p:spPr>
+        <p:style>
+          <a:lnRef idx="2">
+            <a:schemeClr val="accent1">
+              <a:shade val="50000"/>
+            </a:schemeClr>
+          </a:lnRef>
+          <a:fillRef idx="1">
+            <a:schemeClr val="accent1"/>
+          </a:fillRef>
+          <a:effectRef idx="0">
+            <a:schemeClr val="accent1"/>
+          </a:effectRef>
+          <a:fontRef idx="minor">
+            <a:schemeClr val="lt1"/>
+          </a:fontRef>
+        </p:style>
+        <p:txBody>
+          <a:bodyPr rtlCol="0" anchor="ctr"/>
+          <a:lstStyle/>
+          <a:p>
+            <a:pPr algn="ctr"/>
+            <a:r>
+              <a:rPr lang="en-GB" sz="2400" dirty="0"/>
+              <a:t>1</a:t>
+            </a:r>
+            <a:endParaRPr lang="en-US" sz="2400" baseline="-25000" dirty="0"/>
+          </a:p>
+        </p:txBody>
+      </p:sp>
+      <p:sp>
+        <p:nvSpPr>
+          <p:cNvPr id="6" name="Rectangle 5">
+            <a:extLst>
+              <a:ext uri="{FF2B5EF4-FFF2-40B4-BE49-F238E27FC236}">
+                <a16:creationId xmlns:a16="http://schemas.microsoft.com/office/drawing/2014/main" id="{A84CD88D-8D1D-4C5E-99E3-9B5C0DA33449}"/>
+              </a:ext>
+            </a:extLst>
+          </p:cNvPr>
+          <p:cNvSpPr/>
+          <p:nvPr/>
+        </p:nvSpPr>
+        <p:spPr>
+          <a:xfrm>
+            <a:off x="5771322" y="1096617"/>
+            <a:ext cx="410818" cy="397565"/>
+          </a:xfrm>
+          <a:prstGeom prst="rect">
+            <a:avLst/>
+          </a:prstGeom>
+          <a:solidFill>
+            <a:srgbClr val="EA621F"/>
+          </a:solidFill>
+          <a:ln>
+            <a:noFill/>
+          </a:ln>
+        </p:spPr>
+        <p:style>
+          <a:lnRef idx="2">
+            <a:schemeClr val="accent1">
+              <a:shade val="50000"/>
+            </a:schemeClr>
+          </a:lnRef>
+          <a:fillRef idx="1">
+            <a:schemeClr val="accent1"/>
+          </a:fillRef>
+          <a:effectRef idx="0">
+            <a:schemeClr val="accent1"/>
+          </a:effectRef>
+          <a:fontRef idx="minor">
+            <a:schemeClr val="lt1"/>
+          </a:fontRef>
+        </p:style>
+        <p:txBody>
+          <a:bodyPr rtlCol="0" anchor="ctr"/>
+          <a:lstStyle/>
+          <a:p>
+            <a:pPr algn="ctr"/>
+            <a:r>
+              <a:rPr lang="en-GB" sz="2400" dirty="0"/>
+              <a:t>2</a:t>
+            </a:r>
+            <a:endParaRPr lang="en-US" sz="2400" dirty="0"/>
+          </a:p>
+        </p:txBody>
+      </p:sp>
+      <p:sp>
+        <p:nvSpPr>
+          <p:cNvPr id="7" name="Rectangle 6">
+            <a:extLst>
+              <a:ext uri="{FF2B5EF4-FFF2-40B4-BE49-F238E27FC236}">
+                <a16:creationId xmlns:a16="http://schemas.microsoft.com/office/drawing/2014/main" id="{F1F947C1-8C54-492B-92AA-2F495EDD1AC8}"/>
+              </a:ext>
+            </a:extLst>
+          </p:cNvPr>
+          <p:cNvSpPr/>
+          <p:nvPr/>
+        </p:nvSpPr>
+        <p:spPr>
+          <a:xfrm>
+            <a:off x="3392556" y="5251174"/>
+            <a:ext cx="410818" cy="397565"/>
+          </a:xfrm>
+          <a:prstGeom prst="rect">
+            <a:avLst/>
+          </a:prstGeom>
+          <a:solidFill>
+            <a:srgbClr val="EA621F"/>
+          </a:solidFill>
+          <a:ln>
+            <a:noFill/>
+          </a:ln>
+        </p:spPr>
+        <p:style>
+          <a:lnRef idx="2">
+            <a:schemeClr val="accent1">
+              <a:shade val="50000"/>
+            </a:schemeClr>
+          </a:lnRef>
+          <a:fillRef idx="1">
+            <a:schemeClr val="accent1"/>
+          </a:fillRef>
+          <a:effectRef idx="0">
+            <a:schemeClr val="accent1"/>
+          </a:effectRef>
+          <a:fontRef idx="minor">
+            <a:schemeClr val="lt1"/>
+          </a:fontRef>
+        </p:style>
+        <p:txBody>
+          <a:bodyPr rtlCol="0" anchor="ctr"/>
+          <a:lstStyle/>
+          <a:p>
+            <a:pPr algn="ctr"/>
+            <a:r>
+              <a:rPr lang="en-GB" sz="2400" dirty="0"/>
+              <a:t>3</a:t>
+            </a:r>
+            <a:endParaRPr lang="en-US" sz="2400" baseline="-25000" dirty="0"/>
+          </a:p>
+        </p:txBody>
+      </p:sp>
+      <p:sp>
+        <p:nvSpPr>
+          <p:cNvPr id="8" name="Rectangle 7">
+            <a:extLst>
+              <a:ext uri="{FF2B5EF4-FFF2-40B4-BE49-F238E27FC236}">
+                <a16:creationId xmlns:a16="http://schemas.microsoft.com/office/drawing/2014/main" id="{18BDC62C-19AE-43C3-ACC7-9C68D298F263}"/>
+              </a:ext>
+            </a:extLst>
+          </p:cNvPr>
+          <p:cNvSpPr/>
+          <p:nvPr/>
+        </p:nvSpPr>
+        <p:spPr>
+          <a:xfrm>
+            <a:off x="5771322" y="5251174"/>
+            <a:ext cx="410818" cy="397565"/>
+          </a:xfrm>
+          <a:prstGeom prst="rect">
+            <a:avLst/>
+          </a:prstGeom>
+          <a:solidFill>
+            <a:srgbClr val="EA621F"/>
+          </a:solidFill>
+          <a:ln>
+            <a:noFill/>
+          </a:ln>
+        </p:spPr>
+        <p:style>
+          <a:lnRef idx="2">
+            <a:schemeClr val="accent1">
+              <a:shade val="50000"/>
+            </a:schemeClr>
+          </a:lnRef>
+          <a:fillRef idx="1">
+            <a:schemeClr val="accent1"/>
+          </a:fillRef>
+          <a:effectRef idx="0">
+            <a:schemeClr val="accent1"/>
+          </a:effectRef>
+          <a:fontRef idx="minor">
+            <a:schemeClr val="lt1"/>
+          </a:fontRef>
+        </p:style>
+        <p:txBody>
+          <a:bodyPr rtlCol="0" anchor="ctr"/>
+          <a:lstStyle/>
+          <a:p>
+            <a:pPr algn="ctr"/>
+            <a:r>
+              <a:rPr lang="en-GB" sz="2400" dirty="0"/>
+              <a:t>4</a:t>
+            </a:r>
+            <a:endParaRPr lang="en-US" sz="2400" baseline="-25000" dirty="0"/>
+          </a:p>
+        </p:txBody>
+      </p:sp>
+      <p:sp>
+        <p:nvSpPr>
+          <p:cNvPr id="10" name="TextBox 9">
+            <a:extLst>
+              <a:ext uri="{FF2B5EF4-FFF2-40B4-BE49-F238E27FC236}">
+                <a16:creationId xmlns:a16="http://schemas.microsoft.com/office/drawing/2014/main" id="{6DCEACBB-F6FB-40E5-83F5-0999A37D4C3F}"/>
+              </a:ext>
+            </a:extLst>
+          </p:cNvPr>
+          <p:cNvSpPr txBox="1"/>
+          <p:nvPr/>
+        </p:nvSpPr>
+        <p:spPr>
+          <a:xfrm>
+            <a:off x="1285460" y="2474843"/>
+            <a:ext cx="553998" cy="1908313"/>
+          </a:xfrm>
+          <a:prstGeom prst="rect">
+            <a:avLst/>
+          </a:prstGeom>
+          <a:solidFill>
+            <a:srgbClr val="EA621F"/>
+          </a:solidFill>
+        </p:spPr>
+        <p:txBody>
+          <a:bodyPr vert="eaVert" wrap="square" rtlCol="0">
+            <a:spAutoFit/>
+          </a:bodyPr>
+          <a:lstStyle/>
+          <a:p>
+            <a:pPr algn="ctr"/>
+            <a:r>
+              <a:rPr lang="en-GB" sz="2400" dirty="0">
+                <a:solidFill>
+                  <a:schemeClr val="bg1"/>
+                </a:solidFill>
+              </a:rPr>
+              <a:t>source</a:t>
+            </a:r>
+            <a:endParaRPr lang="en-US" sz="2400" dirty="0">
+              <a:solidFill>
+                <a:schemeClr val="bg1"/>
+              </a:solidFill>
+            </a:endParaRPr>
+          </a:p>
+        </p:txBody>
+      </p:sp>
+      <p:sp>
+        <p:nvSpPr>
+          <p:cNvPr id="11" name="TextBox 10">
+            <a:extLst>
+              <a:ext uri="{FF2B5EF4-FFF2-40B4-BE49-F238E27FC236}">
+                <a16:creationId xmlns:a16="http://schemas.microsoft.com/office/drawing/2014/main" id="{A68EA724-2EEB-4E49-BD18-771C1C88110C}"/>
+              </a:ext>
+            </a:extLst>
+          </p:cNvPr>
+          <p:cNvSpPr txBox="1"/>
+          <p:nvPr/>
+        </p:nvSpPr>
+        <p:spPr>
+          <a:xfrm>
+            <a:off x="7615967" y="2385391"/>
+            <a:ext cx="553998" cy="1908313"/>
+          </a:xfrm>
+          <a:prstGeom prst="rect">
+            <a:avLst/>
+          </a:prstGeom>
+          <a:solidFill>
+            <a:srgbClr val="EA621F"/>
+          </a:solidFill>
+        </p:spPr>
+        <p:txBody>
+          <a:bodyPr vert="eaVert" wrap="square" rtlCol="0">
+            <a:spAutoFit/>
+          </a:bodyPr>
+          <a:lstStyle/>
+          <a:p>
+            <a:pPr algn="ctr"/>
+            <a:r>
+              <a:rPr lang="en-GB" sz="2400" dirty="0">
+                <a:solidFill>
+                  <a:schemeClr val="bg1"/>
+                </a:solidFill>
+              </a:rPr>
+              <a:t>drain</a:t>
+            </a:r>
+            <a:endParaRPr lang="en-US" sz="2400" dirty="0">
+              <a:solidFill>
+                <a:schemeClr val="bg1"/>
+              </a:solidFill>
+            </a:endParaRPr>
+          </a:p>
+        </p:txBody>
+      </p:sp>
+      <p:sp>
+        <p:nvSpPr>
+          <p:cNvPr id="12" name="TextBox 11">
+            <a:extLst>
+              <a:ext uri="{FF2B5EF4-FFF2-40B4-BE49-F238E27FC236}">
+                <a16:creationId xmlns:a16="http://schemas.microsoft.com/office/drawing/2014/main" id="{48C173D7-3978-4435-97C0-951298234D30}"/>
+              </a:ext>
+            </a:extLst>
+          </p:cNvPr>
+          <p:cNvSpPr txBox="1"/>
+          <p:nvPr/>
+        </p:nvSpPr>
+        <p:spPr>
+          <a:xfrm>
+            <a:off x="2131588" y="3108714"/>
+            <a:ext cx="409086" cy="461665"/>
+          </a:xfrm>
+          <a:prstGeom prst="rect">
+            <a:avLst/>
+          </a:prstGeom>
+          <a:noFill/>
+        </p:spPr>
+        <p:txBody>
+          <a:bodyPr wrap="none" rtlCol="0">
+            <a:spAutoFit/>
+          </a:bodyPr>
+          <a:lstStyle/>
+          <a:p>
+            <a:r>
+              <a:rPr lang="en-GB" sz="2400" i="1" dirty="0">
+                <a:solidFill>
+                  <a:schemeClr val="bg1"/>
+                </a:solidFill>
+                <a:latin typeface="Cambria" panose="02040503050406030204" pitchFamily="18" charset="0"/>
+                <a:ea typeface="Cambria" panose="02040503050406030204" pitchFamily="18" charset="0"/>
+              </a:rPr>
+              <a:t>w</a:t>
+            </a:r>
+            <a:endParaRPr lang="en-US" sz="2400" i="1" dirty="0">
+              <a:solidFill>
+                <a:schemeClr val="bg1"/>
+              </a:solidFill>
+              <a:latin typeface="Cambria" panose="02040503050406030204" pitchFamily="18" charset="0"/>
+              <a:ea typeface="Cambria" panose="02040503050406030204" pitchFamily="18" charset="0"/>
+            </a:endParaRPr>
+          </a:p>
+        </p:txBody>
+      </p:sp>
+      <p:cxnSp>
+        <p:nvCxnSpPr>
+          <p:cNvPr id="14" name="Straight Arrow Connector 13">
+            <a:extLst>
+              <a:ext uri="{FF2B5EF4-FFF2-40B4-BE49-F238E27FC236}">
+                <a16:creationId xmlns:a16="http://schemas.microsoft.com/office/drawing/2014/main" id="{CFDA41D5-847A-420F-989B-774F8DE85454}"/>
+              </a:ext>
+            </a:extLst>
+          </p:cNvPr>
+          <p:cNvCxnSpPr>
+            <a:cxnSpLocks/>
+          </p:cNvCxnSpPr>
+          <p:nvPr/>
+        </p:nvCxnSpPr>
+        <p:spPr>
+          <a:xfrm flipH="1">
+            <a:off x="3615974" y="2330222"/>
+            <a:ext cx="956026" cy="0"/>
+          </a:xfrm>
+          <a:prstGeom prst="straightConnector1">
+            <a:avLst/>
+          </a:prstGeom>
+          <a:ln w="38100">
+            <a:solidFill>
+              <a:schemeClr val="tx1"/>
+            </a:solidFill>
+            <a:tailEnd type="triangle"/>
+          </a:ln>
+        </p:spPr>
+        <p:style>
+          <a:lnRef idx="1">
+            <a:schemeClr val="accent1"/>
+          </a:lnRef>
+          <a:fillRef idx="0">
+            <a:schemeClr val="accent1"/>
+          </a:fillRef>
+          <a:effectRef idx="0">
+            <a:schemeClr val="accent1"/>
+          </a:effectRef>
+          <a:fontRef idx="minor">
+            <a:schemeClr val="tx1"/>
+          </a:fontRef>
+        </p:style>
+      </p:cxnSp>
+      <p:cxnSp>
+        <p:nvCxnSpPr>
+          <p:cNvPr id="15" name="Straight Arrow Connector 14">
+            <a:extLst>
+              <a:ext uri="{FF2B5EF4-FFF2-40B4-BE49-F238E27FC236}">
+                <a16:creationId xmlns:a16="http://schemas.microsoft.com/office/drawing/2014/main" id="{F7ECDBDD-34E2-4C53-80E4-A70073B8F9DB}"/>
+              </a:ext>
+            </a:extLst>
+          </p:cNvPr>
+          <p:cNvCxnSpPr>
+            <a:cxnSpLocks/>
+          </p:cNvCxnSpPr>
+          <p:nvPr/>
+        </p:nvCxnSpPr>
+        <p:spPr>
+          <a:xfrm flipV="1">
+            <a:off x="2336131" y="3570379"/>
+            <a:ext cx="0" cy="378766"/>
+          </a:xfrm>
+          <a:prstGeom prst="straightConnector1">
+            <a:avLst/>
+          </a:prstGeom>
+          <a:ln w="38100">
+            <a:solidFill>
+              <a:schemeClr val="bg1"/>
+            </a:solidFill>
+            <a:headEnd type="triangle" w="med" len="med"/>
+            <a:tailEnd type="none" w="med" len="med"/>
+          </a:ln>
+        </p:spPr>
+        <p:style>
+          <a:lnRef idx="1">
+            <a:schemeClr val="accent1"/>
+          </a:lnRef>
+          <a:fillRef idx="0">
+            <a:schemeClr val="accent1"/>
+          </a:fillRef>
+          <a:effectRef idx="0">
+            <a:schemeClr val="accent1"/>
+          </a:effectRef>
+          <a:fontRef idx="minor">
+            <a:schemeClr val="tx1"/>
+          </a:fontRef>
+        </p:style>
+      </p:cxnSp>
+      <p:sp>
+        <p:nvSpPr>
+          <p:cNvPr id="16" name="TextBox 15">
+            <a:extLst>
+              <a:ext uri="{FF2B5EF4-FFF2-40B4-BE49-F238E27FC236}">
+                <a16:creationId xmlns:a16="http://schemas.microsoft.com/office/drawing/2014/main" id="{31A3A101-72AE-4DD4-ABEF-24D485B77C05}"/>
+              </a:ext>
+            </a:extLst>
+          </p:cNvPr>
+          <p:cNvSpPr txBox="1"/>
+          <p:nvPr/>
+        </p:nvSpPr>
+        <p:spPr>
+          <a:xfrm>
+            <a:off x="4616848" y="2140730"/>
+            <a:ext cx="268022" cy="461665"/>
+          </a:xfrm>
+          <a:prstGeom prst="rect">
+            <a:avLst/>
+          </a:prstGeom>
+          <a:noFill/>
+        </p:spPr>
+        <p:txBody>
+          <a:bodyPr wrap="none" rtlCol="0">
+            <a:spAutoFit/>
+          </a:bodyPr>
+          <a:lstStyle/>
+          <a:p>
+            <a:r>
+              <a:rPr lang="en-GB" sz="2400" i="1" dirty="0">
+                <a:latin typeface="Cambria" panose="02040503050406030204" pitchFamily="18" charset="0"/>
+                <a:ea typeface="Cambria" panose="02040503050406030204" pitchFamily="18" charset="0"/>
+              </a:rPr>
+              <a:t>l</a:t>
+            </a:r>
+            <a:endParaRPr lang="en-US" sz="2400" i="1" dirty="0">
+              <a:latin typeface="Cambria" panose="02040503050406030204" pitchFamily="18" charset="0"/>
+              <a:ea typeface="Cambria" panose="02040503050406030204" pitchFamily="18" charset="0"/>
+            </a:endParaRPr>
+          </a:p>
+        </p:txBody>
+      </p:sp>
+      <p:cxnSp>
+        <p:nvCxnSpPr>
+          <p:cNvPr id="19" name="Straight Arrow Connector 18">
+            <a:extLst>
+              <a:ext uri="{FF2B5EF4-FFF2-40B4-BE49-F238E27FC236}">
+                <a16:creationId xmlns:a16="http://schemas.microsoft.com/office/drawing/2014/main" id="{EAEA5833-F98A-483B-A92F-74D50E077357}"/>
+              </a:ext>
+            </a:extLst>
+          </p:cNvPr>
+          <p:cNvCxnSpPr>
+            <a:cxnSpLocks/>
+          </p:cNvCxnSpPr>
+          <p:nvPr/>
+        </p:nvCxnSpPr>
+        <p:spPr>
+          <a:xfrm flipH="1">
+            <a:off x="4954444" y="2330222"/>
+            <a:ext cx="956026" cy="0"/>
+          </a:xfrm>
+          <a:prstGeom prst="straightConnector1">
+            <a:avLst/>
+          </a:prstGeom>
+          <a:ln w="38100">
+            <a:solidFill>
+              <a:schemeClr val="tx1"/>
+            </a:solidFill>
+            <a:headEnd type="triangle" w="med" len="med"/>
+            <a:tailEnd type="none" w="med" len="med"/>
+          </a:ln>
+        </p:spPr>
+        <p:style>
+          <a:lnRef idx="1">
+            <a:schemeClr val="accent1"/>
+          </a:lnRef>
+          <a:fillRef idx="0">
+            <a:schemeClr val="accent1"/>
+          </a:fillRef>
+          <a:effectRef idx="0">
+            <a:schemeClr val="accent1"/>
+          </a:effectRef>
+          <a:fontRef idx="minor">
+            <a:schemeClr val="tx1"/>
+          </a:fontRef>
+        </p:style>
+      </p:cxnSp>
+      <p:cxnSp>
+        <p:nvCxnSpPr>
+          <p:cNvPr id="20" name="Straight Arrow Connector 19">
+            <a:extLst>
+              <a:ext uri="{FF2B5EF4-FFF2-40B4-BE49-F238E27FC236}">
+                <a16:creationId xmlns:a16="http://schemas.microsoft.com/office/drawing/2014/main" id="{1968C206-6FB6-4EBF-9977-E09B8D9886D4}"/>
+              </a:ext>
+            </a:extLst>
+          </p:cNvPr>
+          <p:cNvCxnSpPr>
+            <a:cxnSpLocks/>
+          </p:cNvCxnSpPr>
+          <p:nvPr/>
+        </p:nvCxnSpPr>
+        <p:spPr>
+          <a:xfrm flipV="1">
+            <a:off x="2322879" y="2729948"/>
+            <a:ext cx="0" cy="378766"/>
+          </a:xfrm>
+          <a:prstGeom prst="straightConnector1">
+            <a:avLst/>
+          </a:prstGeom>
+          <a:ln w="38100">
+            <a:solidFill>
+              <a:schemeClr val="bg1"/>
+            </a:solidFill>
+            <a:headEnd type="none" w="med" len="med"/>
+            <a:tailEnd type="triangle" w="med" len="med"/>
+          </a:ln>
+        </p:spPr>
+        <p:style>
+          <a:lnRef idx="1">
+            <a:schemeClr val="accent1"/>
+          </a:lnRef>
+          <a:fillRef idx="0">
+            <a:schemeClr val="accent1"/>
+          </a:fillRef>
+          <a:effectRef idx="0">
+            <a:schemeClr val="accent1"/>
+          </a:effectRef>
+          <a:fontRef idx="minor">
+            <a:schemeClr val="tx1"/>
+          </a:fontRef>
+        </p:style>
+      </p:cxnSp>
+      <p:cxnSp>
+        <p:nvCxnSpPr>
+          <p:cNvPr id="23" name="Straight Arrow Connector 22">
+            <a:extLst>
+              <a:ext uri="{FF2B5EF4-FFF2-40B4-BE49-F238E27FC236}">
+                <a16:creationId xmlns:a16="http://schemas.microsoft.com/office/drawing/2014/main" id="{048FD35F-2E8C-48D4-BAF6-CDCD0C776DC4}"/>
+              </a:ext>
+            </a:extLst>
+          </p:cNvPr>
+          <p:cNvCxnSpPr>
+            <a:cxnSpLocks/>
+          </p:cNvCxnSpPr>
+          <p:nvPr/>
+        </p:nvCxnSpPr>
+        <p:spPr>
+          <a:xfrm flipH="1" flipV="1">
+            <a:off x="1839458" y="2342898"/>
+            <a:ext cx="694686" cy="1"/>
+          </a:xfrm>
+          <a:prstGeom prst="straightConnector1">
+            <a:avLst/>
+          </a:prstGeom>
+          <a:ln w="38100">
+            <a:solidFill>
+              <a:schemeClr val="tx1"/>
+            </a:solidFill>
+            <a:tailEnd type="triangle"/>
+          </a:ln>
+        </p:spPr>
+        <p:style>
+          <a:lnRef idx="1">
+            <a:schemeClr val="accent1"/>
+          </a:lnRef>
+          <a:fillRef idx="0">
+            <a:schemeClr val="accent1"/>
+          </a:fillRef>
+          <a:effectRef idx="0">
+            <a:schemeClr val="accent1"/>
+          </a:effectRef>
+          <a:fontRef idx="minor">
+            <a:schemeClr val="tx1"/>
+          </a:fontRef>
+        </p:style>
+      </p:cxnSp>
+      <p:sp>
+        <p:nvSpPr>
+          <p:cNvPr id="24" name="TextBox 23">
+            <a:extLst>
+              <a:ext uri="{FF2B5EF4-FFF2-40B4-BE49-F238E27FC236}">
+                <a16:creationId xmlns:a16="http://schemas.microsoft.com/office/drawing/2014/main" id="{80329CF4-54DF-429B-8958-A183E80EB2A7}"/>
+              </a:ext>
+            </a:extLst>
+          </p:cNvPr>
+          <p:cNvSpPr txBox="1"/>
+          <p:nvPr/>
+        </p:nvSpPr>
+        <p:spPr>
+          <a:xfrm>
+            <a:off x="2578991" y="2153406"/>
+            <a:ext cx="337593" cy="461665"/>
+          </a:xfrm>
+          <a:prstGeom prst="rect">
+            <a:avLst/>
+          </a:prstGeom>
+          <a:noFill/>
+        </p:spPr>
+        <p:txBody>
+          <a:bodyPr wrap="square" rtlCol="0">
+            <a:spAutoFit/>
+          </a:bodyPr>
+          <a:lstStyle/>
+          <a:p>
+            <a:r>
+              <a:rPr lang="en-GB" sz="2400" i="1" dirty="0">
+                <a:latin typeface="Cambria" panose="02040503050406030204" pitchFamily="18" charset="0"/>
+                <a:ea typeface="Cambria" panose="02040503050406030204" pitchFamily="18" charset="0"/>
+              </a:rPr>
+              <a:t>l’</a:t>
+            </a:r>
+            <a:endParaRPr lang="en-US" sz="2400" i="1" dirty="0">
+              <a:latin typeface="Cambria" panose="02040503050406030204" pitchFamily="18" charset="0"/>
+              <a:ea typeface="Cambria" panose="02040503050406030204" pitchFamily="18" charset="0"/>
+            </a:endParaRPr>
+          </a:p>
+        </p:txBody>
+      </p:sp>
+      <p:cxnSp>
+        <p:nvCxnSpPr>
+          <p:cNvPr id="25" name="Straight Arrow Connector 24">
+            <a:extLst>
+              <a:ext uri="{FF2B5EF4-FFF2-40B4-BE49-F238E27FC236}">
+                <a16:creationId xmlns:a16="http://schemas.microsoft.com/office/drawing/2014/main" id="{E07D12A5-48BD-453D-A252-A5B626F3155A}"/>
+              </a:ext>
+            </a:extLst>
+          </p:cNvPr>
+          <p:cNvCxnSpPr>
+            <a:cxnSpLocks/>
+          </p:cNvCxnSpPr>
+          <p:nvPr/>
+        </p:nvCxnSpPr>
+        <p:spPr>
+          <a:xfrm flipH="1">
+            <a:off x="2916588" y="2342898"/>
+            <a:ext cx="606668" cy="0"/>
+          </a:xfrm>
+          <a:prstGeom prst="straightConnector1">
+            <a:avLst/>
+          </a:prstGeom>
+          <a:ln w="38100">
+            <a:solidFill>
+              <a:schemeClr val="tx1"/>
+            </a:solidFill>
+            <a:headEnd type="triangle" w="med" len="med"/>
+            <a:tailEnd type="none" w="med" len="med"/>
+          </a:ln>
+        </p:spPr>
+        <p:style>
+          <a:lnRef idx="1">
+            <a:schemeClr val="accent1"/>
+          </a:lnRef>
+          <a:fillRef idx="0">
+            <a:schemeClr val="accent1"/>
+          </a:fillRef>
+          <a:effectRef idx="0">
+            <a:schemeClr val="accent1"/>
+          </a:effectRef>
+          <a:fontRef idx="minor">
+            <a:schemeClr val="tx1"/>
+          </a:fontRef>
+        </p:style>
+      </p:cxnSp>
+      <p:cxnSp>
+        <p:nvCxnSpPr>
+          <p:cNvPr id="32" name="Straight Arrow Connector 31">
+            <a:extLst>
+              <a:ext uri="{FF2B5EF4-FFF2-40B4-BE49-F238E27FC236}">
+                <a16:creationId xmlns:a16="http://schemas.microsoft.com/office/drawing/2014/main" id="{B514F989-4BD1-4BD7-B665-72C6711A3C9F}"/>
+              </a:ext>
+            </a:extLst>
+          </p:cNvPr>
+          <p:cNvCxnSpPr>
+            <a:cxnSpLocks/>
+          </p:cNvCxnSpPr>
+          <p:nvPr/>
+        </p:nvCxnSpPr>
+        <p:spPr>
+          <a:xfrm flipH="1" flipV="1">
+            <a:off x="6021632" y="2329646"/>
+            <a:ext cx="583524" cy="1"/>
+          </a:xfrm>
+          <a:prstGeom prst="straightConnector1">
+            <a:avLst/>
+          </a:prstGeom>
+          <a:ln w="38100">
+            <a:solidFill>
+              <a:schemeClr val="tx1"/>
+            </a:solidFill>
+            <a:tailEnd type="triangle"/>
+          </a:ln>
+        </p:spPr>
+        <p:style>
+          <a:lnRef idx="1">
+            <a:schemeClr val="accent1"/>
+          </a:lnRef>
+          <a:fillRef idx="0">
+            <a:schemeClr val="accent1"/>
+          </a:fillRef>
+          <a:effectRef idx="0">
+            <a:schemeClr val="accent1"/>
+          </a:effectRef>
+          <a:fontRef idx="minor">
+            <a:schemeClr val="tx1"/>
+          </a:fontRef>
+        </p:style>
+      </p:cxnSp>
+      <p:sp>
+        <p:nvSpPr>
+          <p:cNvPr id="33" name="TextBox 32">
+            <a:extLst>
+              <a:ext uri="{FF2B5EF4-FFF2-40B4-BE49-F238E27FC236}">
+                <a16:creationId xmlns:a16="http://schemas.microsoft.com/office/drawing/2014/main" id="{F541D9EB-26EF-49CE-A4AF-8811067869FE}"/>
+              </a:ext>
+            </a:extLst>
+          </p:cNvPr>
+          <p:cNvSpPr txBox="1"/>
+          <p:nvPr/>
+        </p:nvSpPr>
+        <p:spPr>
+          <a:xfrm>
+            <a:off x="6650003" y="2140154"/>
+            <a:ext cx="418589" cy="461665"/>
+          </a:xfrm>
+          <a:prstGeom prst="rect">
+            <a:avLst/>
+          </a:prstGeom>
+          <a:noFill/>
+        </p:spPr>
+        <p:txBody>
+          <a:bodyPr wrap="square" rtlCol="0">
+            <a:spAutoFit/>
+          </a:bodyPr>
+          <a:lstStyle/>
+          <a:p>
+            <a:r>
+              <a:rPr lang="en-GB" sz="2400" i="1" dirty="0">
+                <a:latin typeface="Cambria" panose="02040503050406030204" pitchFamily="18" charset="0"/>
+                <a:ea typeface="Cambria" panose="02040503050406030204" pitchFamily="18" charset="0"/>
+              </a:rPr>
+              <a:t>l"</a:t>
+            </a:r>
+            <a:endParaRPr lang="en-US" sz="2400" i="1" dirty="0">
+              <a:latin typeface="Cambria" panose="02040503050406030204" pitchFamily="18" charset="0"/>
+              <a:ea typeface="Cambria" panose="02040503050406030204" pitchFamily="18" charset="0"/>
+            </a:endParaRPr>
+          </a:p>
+        </p:txBody>
+      </p:sp>
+      <p:cxnSp>
+        <p:nvCxnSpPr>
+          <p:cNvPr id="34" name="Straight Arrow Connector 33">
+            <a:extLst>
+              <a:ext uri="{FF2B5EF4-FFF2-40B4-BE49-F238E27FC236}">
+                <a16:creationId xmlns:a16="http://schemas.microsoft.com/office/drawing/2014/main" id="{B8D574C6-B771-49E7-8090-C3C8B0FADC4A}"/>
+              </a:ext>
+            </a:extLst>
+          </p:cNvPr>
+          <p:cNvCxnSpPr>
+            <a:cxnSpLocks/>
+          </p:cNvCxnSpPr>
+          <p:nvPr/>
+        </p:nvCxnSpPr>
+        <p:spPr>
+          <a:xfrm flipH="1">
+            <a:off x="6987600" y="2329646"/>
+            <a:ext cx="606668" cy="0"/>
+          </a:xfrm>
+          <a:prstGeom prst="straightConnector1">
+            <a:avLst/>
+          </a:prstGeom>
+          <a:ln w="38100">
+            <a:solidFill>
+              <a:schemeClr val="tx1"/>
+            </a:solidFill>
+            <a:headEnd type="triangle" w="med" len="med"/>
+            <a:tailEnd type="none" w="med" len="med"/>
+          </a:ln>
+        </p:spPr>
+        <p:style>
+          <a:lnRef idx="1">
+            <a:schemeClr val="accent1"/>
+          </a:lnRef>
+          <a:fillRef idx="0">
+            <a:schemeClr val="accent1"/>
+          </a:fillRef>
+          <a:effectRef idx="0">
+            <a:schemeClr val="accent1"/>
+          </a:effectRef>
+          <a:fontRef idx="minor">
+            <a:schemeClr val="tx1"/>
+          </a:fontRef>
+        </p:style>
+      </p:cxnSp>
+      <p:cxnSp>
+        <p:nvCxnSpPr>
+          <p:cNvPr id="26" name="Straight Arrow Connector 25">
+            <a:extLst>
+              <a:ext uri="{FF2B5EF4-FFF2-40B4-BE49-F238E27FC236}">
+                <a16:creationId xmlns:a16="http://schemas.microsoft.com/office/drawing/2014/main" id="{A266FA41-E419-4CD6-BC2A-D85EFF1A0844}"/>
+              </a:ext>
+            </a:extLst>
+          </p:cNvPr>
+          <p:cNvCxnSpPr>
+            <a:cxnSpLocks/>
+          </p:cNvCxnSpPr>
+          <p:nvPr/>
+        </p:nvCxnSpPr>
+        <p:spPr>
+          <a:xfrm flipH="1">
+            <a:off x="3668258" y="4725372"/>
+            <a:ext cx="333291" cy="1"/>
+          </a:xfrm>
+          <a:prstGeom prst="straightConnector1">
+            <a:avLst/>
+          </a:prstGeom>
+          <a:ln w="38100">
+            <a:solidFill>
+              <a:schemeClr val="tx1"/>
+            </a:solidFill>
+            <a:tailEnd type="triangle"/>
+          </a:ln>
+        </p:spPr>
+        <p:style>
+          <a:lnRef idx="1">
+            <a:schemeClr val="accent1"/>
+          </a:lnRef>
+          <a:fillRef idx="0">
+            <a:schemeClr val="accent1"/>
+          </a:fillRef>
+          <a:effectRef idx="0">
+            <a:schemeClr val="accent1"/>
+          </a:effectRef>
+          <a:fontRef idx="minor">
+            <a:schemeClr val="tx1"/>
+          </a:fontRef>
+        </p:style>
+      </p:cxnSp>
+      <p:cxnSp>
+        <p:nvCxnSpPr>
+          <p:cNvPr id="27" name="Straight Arrow Connector 26">
+            <a:extLst>
+              <a:ext uri="{FF2B5EF4-FFF2-40B4-BE49-F238E27FC236}">
+                <a16:creationId xmlns:a16="http://schemas.microsoft.com/office/drawing/2014/main" id="{A3EFB523-77DD-4313-B8AD-87845CDDA013}"/>
+              </a:ext>
+            </a:extLst>
+          </p:cNvPr>
+          <p:cNvCxnSpPr>
+            <a:cxnSpLocks/>
+          </p:cNvCxnSpPr>
+          <p:nvPr/>
+        </p:nvCxnSpPr>
+        <p:spPr>
+          <a:xfrm flipH="1">
+            <a:off x="3173307" y="4725372"/>
+            <a:ext cx="333291" cy="1"/>
+          </a:xfrm>
+          <a:prstGeom prst="straightConnector1">
+            <a:avLst/>
+          </a:prstGeom>
+          <a:ln w="38100">
+            <a:solidFill>
+              <a:schemeClr val="tx1"/>
+            </a:solidFill>
+            <a:headEnd type="triangle" w="med" len="med"/>
+            <a:tailEnd type="none" w="med" len="med"/>
+          </a:ln>
+        </p:spPr>
+        <p:style>
+          <a:lnRef idx="1">
+            <a:schemeClr val="accent1"/>
+          </a:lnRef>
+          <a:fillRef idx="0">
+            <a:schemeClr val="accent1"/>
+          </a:fillRef>
+          <a:effectRef idx="0">
+            <a:schemeClr val="accent1"/>
+          </a:effectRef>
+          <a:fontRef idx="minor">
+            <a:schemeClr val="tx1"/>
+          </a:fontRef>
+        </p:style>
+      </p:cxnSp>
+      <p:sp>
+        <p:nvSpPr>
+          <p:cNvPr id="28" name="TextBox 27">
+            <a:extLst>
+              <a:ext uri="{FF2B5EF4-FFF2-40B4-BE49-F238E27FC236}">
+                <a16:creationId xmlns:a16="http://schemas.microsoft.com/office/drawing/2014/main" id="{C362550B-CBD0-443D-8D3D-2A17C132D394}"/>
+              </a:ext>
+            </a:extLst>
+          </p:cNvPr>
+          <p:cNvSpPr txBox="1"/>
+          <p:nvPr/>
+        </p:nvSpPr>
+        <p:spPr>
+          <a:xfrm>
+            <a:off x="3232664" y="4254755"/>
+            <a:ext cx="346570" cy="461665"/>
+          </a:xfrm>
+          <a:prstGeom prst="rect">
+            <a:avLst/>
+          </a:prstGeom>
+          <a:noFill/>
+        </p:spPr>
+        <p:txBody>
+          <a:bodyPr wrap="none" rtlCol="0">
+            <a:spAutoFit/>
+          </a:bodyPr>
+          <a:lstStyle/>
+          <a:p>
+            <a:r>
+              <a:rPr lang="en-GB" sz="2400" i="1" dirty="0">
+                <a:latin typeface="Cambria" panose="02040503050406030204" pitchFamily="18" charset="0"/>
+                <a:ea typeface="Cambria" panose="02040503050406030204" pitchFamily="18" charset="0"/>
+              </a:rPr>
+              <a:t>a</a:t>
+            </a:r>
+            <a:endParaRPr lang="en-US" sz="2400" i="1" dirty="0">
+              <a:latin typeface="Cambria" panose="02040503050406030204" pitchFamily="18" charset="0"/>
+              <a:ea typeface="Cambria" panose="02040503050406030204" pitchFamily="18" charset="0"/>
+            </a:endParaRPr>
+          </a:p>
+        </p:txBody>
+      </p:sp>
+    </p:spTree>
+    <p:extLst>
+      <p:ext uri="{BB962C8B-B14F-4D97-AF65-F5344CB8AC3E}">
+        <p14:creationId xmlns:p14="http://schemas.microsoft.com/office/powerpoint/2010/main" val="1137778150"/>
+      </p:ext>
+    </p:extLst>
+  </p:cSld>
+  <p:clrMapOvr>
+    <a:masterClrMapping/>
+  </p:clrMapOvr>
+</p:sld>
+</file>
+
+<file path=ppt/slides/slide5.xml><?xml version="1.0" encoding="utf-8"?>
+<p:sld xmlns:a="http://schemas.openxmlformats.org/drawingml/2006/main" xmlns:r="http://schemas.openxmlformats.org/officeDocument/2006/relationships" xmlns:p="http://schemas.openxmlformats.org/presentationml/2006/main">
+  <p:cSld>
+    <p:spTree>
+      <p:nvGrpSpPr>
+        <p:cNvPr id="1" name=""/>
+        <p:cNvGrpSpPr/>
+        <p:nvPr/>
+      </p:nvGrpSpPr>
+      <p:grpSpPr>
+        <a:xfrm>
+          <a:off x="0" y="0"/>
+          <a:ext cx="0" cy="0"/>
+          <a:chOff x="0" y="0"/>
+          <a:chExt cx="0" cy="0"/>
+        </a:xfrm>
+      </p:grpSpPr>
+      <p:sp>
+        <p:nvSpPr>
+          <p:cNvPr id="3" name="Freeform: Shape 2">
+            <a:extLst>
+              <a:ext uri="{FF2B5EF4-FFF2-40B4-BE49-F238E27FC236}">
+                <a16:creationId xmlns:a16="http://schemas.microsoft.com/office/drawing/2014/main" id="{161E3F35-8AE7-4758-AF26-21AA5C484DD0}"/>
+              </a:ext>
+            </a:extLst>
+          </p:cNvPr>
+          <p:cNvSpPr/>
+          <p:nvPr/>
+        </p:nvSpPr>
+        <p:spPr>
+          <a:xfrm>
+            <a:off x="1364974" y="1520687"/>
+            <a:ext cx="6202017" cy="3816626"/>
+          </a:xfrm>
+          <a:custGeom>
+            <a:avLst/>
+            <a:gdLst>
+              <a:gd name="connsiteX0" fmla="*/ 2703443 w 6202017"/>
+              <a:gd name="connsiteY0" fmla="*/ 569844 h 4280452"/>
+              <a:gd name="connsiteX1" fmla="*/ 2703443 w 6202017"/>
+              <a:gd name="connsiteY1" fmla="*/ 569844 h 4280452"/>
+              <a:gd name="connsiteX2" fmla="*/ 2729948 w 6202017"/>
+              <a:gd name="connsiteY2" fmla="*/ 410818 h 4280452"/>
+              <a:gd name="connsiteX3" fmla="*/ 2782956 w 6202017"/>
+              <a:gd name="connsiteY3" fmla="*/ 344557 h 4280452"/>
+              <a:gd name="connsiteX4" fmla="*/ 3087756 w 6202017"/>
+              <a:gd name="connsiteY4" fmla="*/ 198783 h 4280452"/>
+              <a:gd name="connsiteX5" fmla="*/ 3180522 w 6202017"/>
+              <a:gd name="connsiteY5" fmla="*/ 159026 h 4280452"/>
+              <a:gd name="connsiteX6" fmla="*/ 3379304 w 6202017"/>
+              <a:gd name="connsiteY6" fmla="*/ 119270 h 4280452"/>
+              <a:gd name="connsiteX7" fmla="*/ 3445565 w 6202017"/>
+              <a:gd name="connsiteY7" fmla="*/ 106018 h 4280452"/>
+              <a:gd name="connsiteX8" fmla="*/ 3551582 w 6202017"/>
+              <a:gd name="connsiteY8" fmla="*/ 79513 h 4280452"/>
+              <a:gd name="connsiteX9" fmla="*/ 3631095 w 6202017"/>
+              <a:gd name="connsiteY9" fmla="*/ 66261 h 4280452"/>
+              <a:gd name="connsiteX10" fmla="*/ 3750365 w 6202017"/>
+              <a:gd name="connsiteY10" fmla="*/ 26505 h 4280452"/>
+              <a:gd name="connsiteX11" fmla="*/ 3843130 w 6202017"/>
+              <a:gd name="connsiteY11" fmla="*/ 0 h 4280452"/>
+              <a:gd name="connsiteX12" fmla="*/ 4147930 w 6202017"/>
+              <a:gd name="connsiteY12" fmla="*/ 13252 h 4280452"/>
+              <a:gd name="connsiteX13" fmla="*/ 4187687 w 6202017"/>
+              <a:gd name="connsiteY13" fmla="*/ 39757 h 4280452"/>
+              <a:gd name="connsiteX14" fmla="*/ 4227443 w 6202017"/>
+              <a:gd name="connsiteY14" fmla="*/ 53009 h 4280452"/>
+              <a:gd name="connsiteX15" fmla="*/ 4346713 w 6202017"/>
+              <a:gd name="connsiteY15" fmla="*/ 92765 h 4280452"/>
+              <a:gd name="connsiteX16" fmla="*/ 4452730 w 6202017"/>
+              <a:gd name="connsiteY16" fmla="*/ 119270 h 4280452"/>
+              <a:gd name="connsiteX17" fmla="*/ 4492487 w 6202017"/>
+              <a:gd name="connsiteY17" fmla="*/ 132522 h 4280452"/>
+              <a:gd name="connsiteX18" fmla="*/ 4757530 w 6202017"/>
+              <a:gd name="connsiteY18" fmla="*/ 159026 h 4280452"/>
+              <a:gd name="connsiteX19" fmla="*/ 4929809 w 6202017"/>
+              <a:gd name="connsiteY19" fmla="*/ 225287 h 4280452"/>
+              <a:gd name="connsiteX20" fmla="*/ 5009322 w 6202017"/>
+              <a:gd name="connsiteY20" fmla="*/ 304800 h 4280452"/>
+              <a:gd name="connsiteX21" fmla="*/ 5035826 w 6202017"/>
+              <a:gd name="connsiteY21" fmla="*/ 344557 h 4280452"/>
+              <a:gd name="connsiteX22" fmla="*/ 5075582 w 6202017"/>
+              <a:gd name="connsiteY22" fmla="*/ 357809 h 4280452"/>
+              <a:gd name="connsiteX23" fmla="*/ 5141843 w 6202017"/>
+              <a:gd name="connsiteY23" fmla="*/ 384313 h 4280452"/>
+              <a:gd name="connsiteX24" fmla="*/ 5327374 w 6202017"/>
+              <a:gd name="connsiteY24" fmla="*/ 503583 h 4280452"/>
+              <a:gd name="connsiteX25" fmla="*/ 5406887 w 6202017"/>
+              <a:gd name="connsiteY25" fmla="*/ 543339 h 4280452"/>
+              <a:gd name="connsiteX26" fmla="*/ 5565913 w 6202017"/>
+              <a:gd name="connsiteY26" fmla="*/ 675861 h 4280452"/>
+              <a:gd name="connsiteX27" fmla="*/ 5605669 w 6202017"/>
+              <a:gd name="connsiteY27" fmla="*/ 715618 h 4280452"/>
+              <a:gd name="connsiteX28" fmla="*/ 5671930 w 6202017"/>
+              <a:gd name="connsiteY28" fmla="*/ 742122 h 4280452"/>
+              <a:gd name="connsiteX29" fmla="*/ 5724939 w 6202017"/>
+              <a:gd name="connsiteY29" fmla="*/ 808383 h 4280452"/>
+              <a:gd name="connsiteX30" fmla="*/ 5777948 w 6202017"/>
+              <a:gd name="connsiteY30" fmla="*/ 887896 h 4280452"/>
+              <a:gd name="connsiteX31" fmla="*/ 5857461 w 6202017"/>
+              <a:gd name="connsiteY31" fmla="*/ 993913 h 4280452"/>
+              <a:gd name="connsiteX32" fmla="*/ 5870713 w 6202017"/>
+              <a:gd name="connsiteY32" fmla="*/ 1033670 h 4280452"/>
+              <a:gd name="connsiteX33" fmla="*/ 5923722 w 6202017"/>
+              <a:gd name="connsiteY33" fmla="*/ 1113183 h 4280452"/>
+              <a:gd name="connsiteX34" fmla="*/ 5950226 w 6202017"/>
+              <a:gd name="connsiteY34" fmla="*/ 1205948 h 4280452"/>
+              <a:gd name="connsiteX35" fmla="*/ 5976730 w 6202017"/>
+              <a:gd name="connsiteY35" fmla="*/ 1258957 h 4280452"/>
+              <a:gd name="connsiteX36" fmla="*/ 5989982 w 6202017"/>
+              <a:gd name="connsiteY36" fmla="*/ 1325218 h 4280452"/>
+              <a:gd name="connsiteX37" fmla="*/ 6016487 w 6202017"/>
+              <a:gd name="connsiteY37" fmla="*/ 1378226 h 4280452"/>
+              <a:gd name="connsiteX38" fmla="*/ 6029739 w 6202017"/>
+              <a:gd name="connsiteY38" fmla="*/ 1417983 h 4280452"/>
+              <a:gd name="connsiteX39" fmla="*/ 6056243 w 6202017"/>
+              <a:gd name="connsiteY39" fmla="*/ 1470992 h 4280452"/>
+              <a:gd name="connsiteX40" fmla="*/ 6109252 w 6202017"/>
+              <a:gd name="connsiteY40" fmla="*/ 1630018 h 4280452"/>
+              <a:gd name="connsiteX41" fmla="*/ 6149009 w 6202017"/>
+              <a:gd name="connsiteY41" fmla="*/ 1736035 h 4280452"/>
+              <a:gd name="connsiteX42" fmla="*/ 6175513 w 6202017"/>
+              <a:gd name="connsiteY42" fmla="*/ 1842052 h 4280452"/>
+              <a:gd name="connsiteX43" fmla="*/ 6202017 w 6202017"/>
+              <a:gd name="connsiteY43" fmla="*/ 1961322 h 4280452"/>
+              <a:gd name="connsiteX44" fmla="*/ 6188765 w 6202017"/>
+              <a:gd name="connsiteY44" fmla="*/ 2358887 h 4280452"/>
+              <a:gd name="connsiteX45" fmla="*/ 6175513 w 6202017"/>
+              <a:gd name="connsiteY45" fmla="*/ 2464905 h 4280452"/>
+              <a:gd name="connsiteX46" fmla="*/ 6122504 w 6202017"/>
+              <a:gd name="connsiteY46" fmla="*/ 2570922 h 4280452"/>
+              <a:gd name="connsiteX47" fmla="*/ 6029739 w 6202017"/>
+              <a:gd name="connsiteY47" fmla="*/ 2663687 h 4280452"/>
+              <a:gd name="connsiteX48" fmla="*/ 5857461 w 6202017"/>
+              <a:gd name="connsiteY48" fmla="*/ 2809461 h 4280452"/>
+              <a:gd name="connsiteX49" fmla="*/ 5738191 w 6202017"/>
+              <a:gd name="connsiteY49" fmla="*/ 2928731 h 4280452"/>
+              <a:gd name="connsiteX50" fmla="*/ 5406887 w 6202017"/>
+              <a:gd name="connsiteY50" fmla="*/ 3220278 h 4280452"/>
+              <a:gd name="connsiteX51" fmla="*/ 5274365 w 6202017"/>
+              <a:gd name="connsiteY51" fmla="*/ 3405809 h 4280452"/>
+              <a:gd name="connsiteX52" fmla="*/ 5155095 w 6202017"/>
+              <a:gd name="connsiteY52" fmla="*/ 3511826 h 4280452"/>
+              <a:gd name="connsiteX53" fmla="*/ 5088835 w 6202017"/>
+              <a:gd name="connsiteY53" fmla="*/ 3591339 h 4280452"/>
+              <a:gd name="connsiteX54" fmla="*/ 5022574 w 6202017"/>
+              <a:gd name="connsiteY54" fmla="*/ 3657600 h 4280452"/>
+              <a:gd name="connsiteX55" fmla="*/ 4982817 w 6202017"/>
+              <a:gd name="connsiteY55" fmla="*/ 3737113 h 4280452"/>
+              <a:gd name="connsiteX56" fmla="*/ 4943061 w 6202017"/>
+              <a:gd name="connsiteY56" fmla="*/ 3776870 h 4280452"/>
+              <a:gd name="connsiteX57" fmla="*/ 4916556 w 6202017"/>
+              <a:gd name="connsiteY57" fmla="*/ 3816626 h 4280452"/>
+              <a:gd name="connsiteX58" fmla="*/ 4850295 w 6202017"/>
+              <a:gd name="connsiteY58" fmla="*/ 3882887 h 4280452"/>
+              <a:gd name="connsiteX59" fmla="*/ 4797287 w 6202017"/>
+              <a:gd name="connsiteY59" fmla="*/ 3949148 h 4280452"/>
+              <a:gd name="connsiteX60" fmla="*/ 4757530 w 6202017"/>
+              <a:gd name="connsiteY60" fmla="*/ 3988905 h 4280452"/>
+              <a:gd name="connsiteX61" fmla="*/ 4717774 w 6202017"/>
+              <a:gd name="connsiteY61" fmla="*/ 4041913 h 4280452"/>
+              <a:gd name="connsiteX62" fmla="*/ 4691269 w 6202017"/>
+              <a:gd name="connsiteY62" fmla="*/ 4081670 h 4280452"/>
+              <a:gd name="connsiteX63" fmla="*/ 4651513 w 6202017"/>
+              <a:gd name="connsiteY63" fmla="*/ 4108174 h 4280452"/>
+              <a:gd name="connsiteX64" fmla="*/ 4585252 w 6202017"/>
+              <a:gd name="connsiteY64" fmla="*/ 4161183 h 4280452"/>
+              <a:gd name="connsiteX65" fmla="*/ 4532243 w 6202017"/>
+              <a:gd name="connsiteY65" fmla="*/ 4174435 h 4280452"/>
+              <a:gd name="connsiteX66" fmla="*/ 4439478 w 6202017"/>
+              <a:gd name="connsiteY66" fmla="*/ 4200939 h 4280452"/>
+              <a:gd name="connsiteX67" fmla="*/ 4280452 w 6202017"/>
+              <a:gd name="connsiteY67" fmla="*/ 4227444 h 4280452"/>
+              <a:gd name="connsiteX68" fmla="*/ 4200939 w 6202017"/>
+              <a:gd name="connsiteY68" fmla="*/ 4240696 h 4280452"/>
+              <a:gd name="connsiteX69" fmla="*/ 4108174 w 6202017"/>
+              <a:gd name="connsiteY69" fmla="*/ 4267200 h 4280452"/>
+              <a:gd name="connsiteX70" fmla="*/ 4055165 w 6202017"/>
+              <a:gd name="connsiteY70" fmla="*/ 4280452 h 4280452"/>
+              <a:gd name="connsiteX71" fmla="*/ 2504661 w 6202017"/>
+              <a:gd name="connsiteY71" fmla="*/ 4267200 h 4280452"/>
+              <a:gd name="connsiteX72" fmla="*/ 2491409 w 6202017"/>
+              <a:gd name="connsiteY72" fmla="*/ 4200939 h 4280452"/>
+              <a:gd name="connsiteX73" fmla="*/ 2411895 w 6202017"/>
+              <a:gd name="connsiteY73" fmla="*/ 4174435 h 4280452"/>
+              <a:gd name="connsiteX74" fmla="*/ 2358887 w 6202017"/>
+              <a:gd name="connsiteY74" fmla="*/ 4147931 h 4280452"/>
+              <a:gd name="connsiteX75" fmla="*/ 2279374 w 6202017"/>
+              <a:gd name="connsiteY75" fmla="*/ 4121426 h 4280452"/>
+              <a:gd name="connsiteX76" fmla="*/ 2160104 w 6202017"/>
+              <a:gd name="connsiteY76" fmla="*/ 4068418 h 4280452"/>
+              <a:gd name="connsiteX77" fmla="*/ 1855304 w 6202017"/>
+              <a:gd name="connsiteY77" fmla="*/ 3962400 h 4280452"/>
+              <a:gd name="connsiteX78" fmla="*/ 1683026 w 6202017"/>
+              <a:gd name="connsiteY78" fmla="*/ 3896139 h 4280452"/>
+              <a:gd name="connsiteX79" fmla="*/ 1524000 w 6202017"/>
+              <a:gd name="connsiteY79" fmla="*/ 3869635 h 4280452"/>
+              <a:gd name="connsiteX80" fmla="*/ 1364974 w 6202017"/>
+              <a:gd name="connsiteY80" fmla="*/ 3829878 h 4280452"/>
+              <a:gd name="connsiteX81" fmla="*/ 1245704 w 6202017"/>
+              <a:gd name="connsiteY81" fmla="*/ 3790122 h 4280452"/>
+              <a:gd name="connsiteX82" fmla="*/ 1139687 w 6202017"/>
+              <a:gd name="connsiteY82" fmla="*/ 3750365 h 4280452"/>
+              <a:gd name="connsiteX83" fmla="*/ 1046922 w 6202017"/>
+              <a:gd name="connsiteY83" fmla="*/ 3737113 h 4280452"/>
+              <a:gd name="connsiteX84" fmla="*/ 874643 w 6202017"/>
+              <a:gd name="connsiteY84" fmla="*/ 3684105 h 4280452"/>
+              <a:gd name="connsiteX85" fmla="*/ 702365 w 6202017"/>
+              <a:gd name="connsiteY85" fmla="*/ 3617844 h 4280452"/>
+              <a:gd name="connsiteX86" fmla="*/ 516835 w 6202017"/>
+              <a:gd name="connsiteY86" fmla="*/ 3525078 h 4280452"/>
+              <a:gd name="connsiteX87" fmla="*/ 424069 w 6202017"/>
+              <a:gd name="connsiteY87" fmla="*/ 3472070 h 4280452"/>
+              <a:gd name="connsiteX88" fmla="*/ 344556 w 6202017"/>
+              <a:gd name="connsiteY88" fmla="*/ 3419061 h 4280452"/>
+              <a:gd name="connsiteX89" fmla="*/ 265043 w 6202017"/>
+              <a:gd name="connsiteY89" fmla="*/ 3392557 h 4280452"/>
+              <a:gd name="connsiteX90" fmla="*/ 185530 w 6202017"/>
+              <a:gd name="connsiteY90" fmla="*/ 3339548 h 4280452"/>
+              <a:gd name="connsiteX91" fmla="*/ 119269 w 6202017"/>
+              <a:gd name="connsiteY91" fmla="*/ 3273287 h 4280452"/>
+              <a:gd name="connsiteX92" fmla="*/ 53009 w 6202017"/>
+              <a:gd name="connsiteY92" fmla="*/ 3048000 h 4280452"/>
+              <a:gd name="connsiteX93" fmla="*/ 26504 w 6202017"/>
+              <a:gd name="connsiteY93" fmla="*/ 2941983 h 4280452"/>
+              <a:gd name="connsiteX94" fmla="*/ 0 w 6202017"/>
+              <a:gd name="connsiteY94" fmla="*/ 2849218 h 4280452"/>
+              <a:gd name="connsiteX95" fmla="*/ 66261 w 6202017"/>
+              <a:gd name="connsiteY95" fmla="*/ 2398644 h 4280452"/>
+              <a:gd name="connsiteX96" fmla="*/ 198782 w 6202017"/>
+              <a:gd name="connsiteY96" fmla="*/ 2199861 h 4280452"/>
+              <a:gd name="connsiteX97" fmla="*/ 238539 w 6202017"/>
+              <a:gd name="connsiteY97" fmla="*/ 2107096 h 4280452"/>
+              <a:gd name="connsiteX98" fmla="*/ 265043 w 6202017"/>
+              <a:gd name="connsiteY98" fmla="*/ 2067339 h 4280452"/>
+              <a:gd name="connsiteX99" fmla="*/ 318052 w 6202017"/>
+              <a:gd name="connsiteY99" fmla="*/ 2014331 h 4280452"/>
+              <a:gd name="connsiteX100" fmla="*/ 357809 w 6202017"/>
+              <a:gd name="connsiteY100" fmla="*/ 1948070 h 4280452"/>
+              <a:gd name="connsiteX101" fmla="*/ 424069 w 6202017"/>
+              <a:gd name="connsiteY101" fmla="*/ 1895061 h 4280452"/>
+              <a:gd name="connsiteX102" fmla="*/ 477078 w 6202017"/>
+              <a:gd name="connsiteY102" fmla="*/ 1828800 h 4280452"/>
+              <a:gd name="connsiteX103" fmla="*/ 516835 w 6202017"/>
+              <a:gd name="connsiteY103" fmla="*/ 1815548 h 4280452"/>
+              <a:gd name="connsiteX104" fmla="*/ 622852 w 6202017"/>
+              <a:gd name="connsiteY104" fmla="*/ 1789044 h 4280452"/>
+              <a:gd name="connsiteX105" fmla="*/ 675861 w 6202017"/>
+              <a:gd name="connsiteY105" fmla="*/ 1762539 h 4280452"/>
+              <a:gd name="connsiteX106" fmla="*/ 795130 w 6202017"/>
+              <a:gd name="connsiteY106" fmla="*/ 1709531 h 4280452"/>
+              <a:gd name="connsiteX107" fmla="*/ 954156 w 6202017"/>
+              <a:gd name="connsiteY107" fmla="*/ 1577009 h 4280452"/>
+              <a:gd name="connsiteX108" fmla="*/ 1033669 w 6202017"/>
+              <a:gd name="connsiteY108" fmla="*/ 1510748 h 4280452"/>
+              <a:gd name="connsiteX109" fmla="*/ 1258956 w 6202017"/>
+              <a:gd name="connsiteY109" fmla="*/ 1431235 h 4280452"/>
+              <a:gd name="connsiteX110" fmla="*/ 1351722 w 6202017"/>
+              <a:gd name="connsiteY110" fmla="*/ 1391478 h 4280452"/>
+              <a:gd name="connsiteX111" fmla="*/ 1417982 w 6202017"/>
+              <a:gd name="connsiteY111" fmla="*/ 1378226 h 4280452"/>
+              <a:gd name="connsiteX112" fmla="*/ 1590261 w 6202017"/>
+              <a:gd name="connsiteY112" fmla="*/ 1351722 h 4280452"/>
+              <a:gd name="connsiteX113" fmla="*/ 1722782 w 6202017"/>
+              <a:gd name="connsiteY113" fmla="*/ 1258957 h 4280452"/>
+              <a:gd name="connsiteX114" fmla="*/ 1868556 w 6202017"/>
+              <a:gd name="connsiteY114" fmla="*/ 1192696 h 4280452"/>
+              <a:gd name="connsiteX115" fmla="*/ 2080591 w 6202017"/>
+              <a:gd name="connsiteY115" fmla="*/ 1099931 h 4280452"/>
+              <a:gd name="connsiteX116" fmla="*/ 2120348 w 6202017"/>
+              <a:gd name="connsiteY116" fmla="*/ 1060174 h 4280452"/>
+              <a:gd name="connsiteX117" fmla="*/ 2345635 w 6202017"/>
+              <a:gd name="connsiteY117" fmla="*/ 914400 h 4280452"/>
+              <a:gd name="connsiteX118" fmla="*/ 2398643 w 6202017"/>
+              <a:gd name="connsiteY118" fmla="*/ 861392 h 4280452"/>
+              <a:gd name="connsiteX119" fmla="*/ 2478156 w 6202017"/>
+              <a:gd name="connsiteY119" fmla="*/ 808383 h 4280452"/>
+              <a:gd name="connsiteX120" fmla="*/ 2557669 w 6202017"/>
+              <a:gd name="connsiteY120" fmla="*/ 742122 h 4280452"/>
+              <a:gd name="connsiteX121" fmla="*/ 2584174 w 6202017"/>
+              <a:gd name="connsiteY121" fmla="*/ 702365 h 4280452"/>
+              <a:gd name="connsiteX122" fmla="*/ 2663687 w 6202017"/>
+              <a:gd name="connsiteY122" fmla="*/ 675861 h 4280452"/>
+              <a:gd name="connsiteX123" fmla="*/ 2729948 w 6202017"/>
+              <a:gd name="connsiteY123" fmla="*/ 583096 h 4280452"/>
+              <a:gd name="connsiteX124" fmla="*/ 2703443 w 6202017"/>
+              <a:gd name="connsiteY124" fmla="*/ 569844 h 4280452"/>
+            </a:gdLst>
+            <a:ahLst/>
+            <a:cxnLst>
+              <a:cxn ang="0">
+                <a:pos x="connsiteX0" y="connsiteY0"/>
+              </a:cxn>
+              <a:cxn ang="0">
+                <a:pos x="connsiteX1" y="connsiteY1"/>
+              </a:cxn>
+              <a:cxn ang="0">
+                <a:pos x="connsiteX2" y="connsiteY2"/>
+              </a:cxn>
+              <a:cxn ang="0">
+                <a:pos x="connsiteX3" y="connsiteY3"/>
+              </a:cxn>
+              <a:cxn ang="0">
+                <a:pos x="connsiteX4" y="connsiteY4"/>
+              </a:cxn>
+              <a:cxn ang="0">
+                <a:pos x="connsiteX5" y="connsiteY5"/>
+              </a:cxn>
+              <a:cxn ang="0">
+                <a:pos x="connsiteX6" y="connsiteY6"/>
+              </a:cxn>
+              <a:cxn ang="0">
+                <a:pos x="connsiteX7" y="connsiteY7"/>
+              </a:cxn>
+              <a:cxn ang="0">
+                <a:pos x="connsiteX8" y="connsiteY8"/>
+              </a:cxn>
+              <a:cxn ang="0">
+                <a:pos x="connsiteX9" y="connsiteY9"/>
+              </a:cxn>
+              <a:cxn ang="0">
+                <a:pos x="connsiteX10" y="connsiteY10"/>
+              </a:cxn>
+              <a:cxn ang="0">
+                <a:pos x="connsiteX11" y="connsiteY11"/>
+              </a:cxn>
+              <a:cxn ang="0">
+                <a:pos x="connsiteX12" y="connsiteY12"/>
+              </a:cxn>
+              <a:cxn ang="0">
+                <a:pos x="connsiteX13" y="connsiteY13"/>
+              </a:cxn>
+              <a:cxn ang="0">
+                <a:pos x="connsiteX14" y="connsiteY14"/>
+              </a:cxn>
+              <a:cxn ang="0">
+                <a:pos x="connsiteX15" y="connsiteY15"/>
+              </a:cxn>
+              <a:cxn ang="0">
+                <a:pos x="connsiteX16" y="connsiteY16"/>
+              </a:cxn>
+              <a:cxn ang="0">
+                <a:pos x="connsiteX17" y="connsiteY17"/>
+              </a:cxn>
+              <a:cxn ang="0">
+                <a:pos x="connsiteX18" y="connsiteY18"/>
+              </a:cxn>
+              <a:cxn ang="0">
+                <a:pos x="connsiteX19" y="connsiteY19"/>
+              </a:cxn>
+              <a:cxn ang="0">
+                <a:pos x="connsiteX20" y="connsiteY20"/>
+              </a:cxn>
+              <a:cxn ang="0">
+                <a:pos x="connsiteX21" y="connsiteY21"/>
+              </a:cxn>
+              <a:cxn ang="0">
+                <a:pos x="connsiteX22" y="connsiteY22"/>
+              </a:cxn>
+              <a:cxn ang="0">
+                <a:pos x="connsiteX23" y="connsiteY23"/>
+              </a:cxn>
+              <a:cxn ang="0">
+                <a:pos x="connsiteX24" y="connsiteY24"/>
+              </a:cxn>
+              <a:cxn ang="0">
+                <a:pos x="connsiteX25" y="connsiteY25"/>
+              </a:cxn>
+              <a:cxn ang="0">
+                <a:pos x="connsiteX26" y="connsiteY26"/>
+              </a:cxn>
+              <a:cxn ang="0">
+                <a:pos x="connsiteX27" y="connsiteY27"/>
+              </a:cxn>
+              <a:cxn ang="0">
+                <a:pos x="connsiteX28" y="connsiteY28"/>
+              </a:cxn>
+              <a:cxn ang="0">
+                <a:pos x="connsiteX29" y="connsiteY29"/>
+              </a:cxn>
+              <a:cxn ang="0">
+                <a:pos x="connsiteX30" y="connsiteY30"/>
+              </a:cxn>
+              <a:cxn ang="0">
+                <a:pos x="connsiteX31" y="connsiteY31"/>
+              </a:cxn>
+              <a:cxn ang="0">
+                <a:pos x="connsiteX32" y="connsiteY32"/>
+              </a:cxn>
+              <a:cxn ang="0">
+                <a:pos x="connsiteX33" y="connsiteY33"/>
+              </a:cxn>
+              <a:cxn ang="0">
+                <a:pos x="connsiteX34" y="connsiteY34"/>
+              </a:cxn>
+              <a:cxn ang="0">
+                <a:pos x="connsiteX35" y="connsiteY35"/>
+              </a:cxn>
+              <a:cxn ang="0">
+                <a:pos x="connsiteX36" y="connsiteY36"/>
+              </a:cxn>
+              <a:cxn ang="0">
+                <a:pos x="connsiteX37" y="connsiteY37"/>
+              </a:cxn>
+              <a:cxn ang="0">
+                <a:pos x="connsiteX38" y="connsiteY38"/>
+              </a:cxn>
+              <a:cxn ang="0">
+                <a:pos x="connsiteX39" y="connsiteY39"/>
+              </a:cxn>
+              <a:cxn ang="0">
+                <a:pos x="connsiteX40" y="connsiteY40"/>
+              </a:cxn>
+              <a:cxn ang="0">
+                <a:pos x="connsiteX41" y="connsiteY41"/>
+              </a:cxn>
+              <a:cxn ang="0">
+                <a:pos x="connsiteX42" y="connsiteY42"/>
+              </a:cxn>
+              <a:cxn ang="0">
+                <a:pos x="connsiteX43" y="connsiteY43"/>
+              </a:cxn>
+              <a:cxn ang="0">
+                <a:pos x="connsiteX44" y="connsiteY44"/>
+              </a:cxn>
+              <a:cxn ang="0">
+                <a:pos x="connsiteX45" y="connsiteY45"/>
+              </a:cxn>
+              <a:cxn ang="0">
+                <a:pos x="connsiteX46" y="connsiteY46"/>
+              </a:cxn>
+              <a:cxn ang="0">
+                <a:pos x="connsiteX47" y="connsiteY47"/>
+              </a:cxn>
+              <a:cxn ang="0">
+                <a:pos x="connsiteX48" y="connsiteY48"/>
+              </a:cxn>
+              <a:cxn ang="0">
+                <a:pos x="connsiteX49" y="connsiteY49"/>
+              </a:cxn>
+              <a:cxn ang="0">
+                <a:pos x="connsiteX50" y="connsiteY50"/>
+              </a:cxn>
+              <a:cxn ang="0">
+                <a:pos x="connsiteX51" y="connsiteY51"/>
+              </a:cxn>
+              <a:cxn ang="0">
+                <a:pos x="connsiteX52" y="connsiteY52"/>
+              </a:cxn>
+              <a:cxn ang="0">
+                <a:pos x="connsiteX53" y="connsiteY53"/>
+              </a:cxn>
+              <a:cxn ang="0">
+                <a:pos x="connsiteX54" y="connsiteY54"/>
+              </a:cxn>
+              <a:cxn ang="0">
+                <a:pos x="connsiteX55" y="connsiteY55"/>
+              </a:cxn>
+              <a:cxn ang="0">
+                <a:pos x="connsiteX56" y="connsiteY56"/>
+              </a:cxn>
+              <a:cxn ang="0">
+                <a:pos x="connsiteX57" y="connsiteY57"/>
+              </a:cxn>
+              <a:cxn ang="0">
+                <a:pos x="connsiteX58" y="connsiteY58"/>
+              </a:cxn>
+              <a:cxn ang="0">
+                <a:pos x="connsiteX59" y="connsiteY59"/>
+              </a:cxn>
+              <a:cxn ang="0">
+                <a:pos x="connsiteX60" y="connsiteY60"/>
+              </a:cxn>
+              <a:cxn ang="0">
+                <a:pos x="connsiteX61" y="connsiteY61"/>
+              </a:cxn>
+              <a:cxn ang="0">
+                <a:pos x="connsiteX62" y="connsiteY62"/>
+              </a:cxn>
+              <a:cxn ang="0">
+                <a:pos x="connsiteX63" y="connsiteY63"/>
+              </a:cxn>
+              <a:cxn ang="0">
+                <a:pos x="connsiteX64" y="connsiteY64"/>
+              </a:cxn>
+              <a:cxn ang="0">
+                <a:pos x="connsiteX65" y="connsiteY65"/>
+              </a:cxn>
+              <a:cxn ang="0">
+                <a:pos x="connsiteX66" y="connsiteY66"/>
+              </a:cxn>
+              <a:cxn ang="0">
+                <a:pos x="connsiteX67" y="connsiteY67"/>
+              </a:cxn>
+              <a:cxn ang="0">
+                <a:pos x="connsiteX68" y="connsiteY68"/>
+              </a:cxn>
+              <a:cxn ang="0">
+                <a:pos x="connsiteX69" y="connsiteY69"/>
+              </a:cxn>
+              <a:cxn ang="0">
+                <a:pos x="connsiteX70" y="connsiteY70"/>
+              </a:cxn>
+              <a:cxn ang="0">
+                <a:pos x="connsiteX71" y="connsiteY71"/>
+              </a:cxn>
+              <a:cxn ang="0">
+                <a:pos x="connsiteX72" y="connsiteY72"/>
+              </a:cxn>
+              <a:cxn ang="0">
+                <a:pos x="connsiteX73" y="connsiteY73"/>
+              </a:cxn>
+              <a:cxn ang="0">
+                <a:pos x="connsiteX74" y="connsiteY74"/>
+              </a:cxn>
+              <a:cxn ang="0">
+                <a:pos x="connsiteX75" y="connsiteY75"/>
+              </a:cxn>
+              <a:cxn ang="0">
+                <a:pos x="connsiteX76" y="connsiteY76"/>
+              </a:cxn>
+              <a:cxn ang="0">
+                <a:pos x="connsiteX77" y="connsiteY77"/>
+              </a:cxn>
+              <a:cxn ang="0">
+                <a:pos x="connsiteX78" y="connsiteY78"/>
+              </a:cxn>
+              <a:cxn ang="0">
+                <a:pos x="connsiteX79" y="connsiteY79"/>
+              </a:cxn>
+              <a:cxn ang="0">
+                <a:pos x="connsiteX80" y="connsiteY80"/>
+              </a:cxn>
+              <a:cxn ang="0">
+                <a:pos x="connsiteX81" y="connsiteY81"/>
+              </a:cxn>
+              <a:cxn ang="0">
+                <a:pos x="connsiteX82" y="connsiteY82"/>
+              </a:cxn>
+              <a:cxn ang="0">
+                <a:pos x="connsiteX83" y="connsiteY83"/>
+              </a:cxn>
+              <a:cxn ang="0">
+                <a:pos x="connsiteX84" y="connsiteY84"/>
+              </a:cxn>
+              <a:cxn ang="0">
+                <a:pos x="connsiteX85" y="connsiteY85"/>
+              </a:cxn>
+              <a:cxn ang="0">
+                <a:pos x="connsiteX86" y="connsiteY86"/>
+              </a:cxn>
+              <a:cxn ang="0">
+                <a:pos x="connsiteX87" y="connsiteY87"/>
+              </a:cxn>
+              <a:cxn ang="0">
+                <a:pos x="connsiteX88" y="connsiteY88"/>
+              </a:cxn>
+              <a:cxn ang="0">
+                <a:pos x="connsiteX89" y="connsiteY89"/>
+              </a:cxn>
+              <a:cxn ang="0">
+                <a:pos x="connsiteX90" y="connsiteY90"/>
+              </a:cxn>
+              <a:cxn ang="0">
+                <a:pos x="connsiteX91" y="connsiteY91"/>
+              </a:cxn>
+              <a:cxn ang="0">
+                <a:pos x="connsiteX92" y="connsiteY92"/>
+              </a:cxn>
+              <a:cxn ang="0">
+                <a:pos x="connsiteX93" y="connsiteY93"/>
+              </a:cxn>
+              <a:cxn ang="0">
+                <a:pos x="connsiteX94" y="connsiteY94"/>
+              </a:cxn>
+              <a:cxn ang="0">
+                <a:pos x="connsiteX95" y="connsiteY95"/>
+              </a:cxn>
+              <a:cxn ang="0">
+                <a:pos x="connsiteX96" y="connsiteY96"/>
+              </a:cxn>
+              <a:cxn ang="0">
+                <a:pos x="connsiteX97" y="connsiteY97"/>
+              </a:cxn>
+              <a:cxn ang="0">
+                <a:pos x="connsiteX98" y="connsiteY98"/>
+              </a:cxn>
+              <a:cxn ang="0">
+                <a:pos x="connsiteX99" y="connsiteY99"/>
+              </a:cxn>
+              <a:cxn ang="0">
+                <a:pos x="connsiteX100" y="connsiteY100"/>
+              </a:cxn>
+              <a:cxn ang="0">
+                <a:pos x="connsiteX101" y="connsiteY101"/>
+              </a:cxn>
+              <a:cxn ang="0">
+                <a:pos x="connsiteX102" y="connsiteY102"/>
+              </a:cxn>
+              <a:cxn ang="0">
+                <a:pos x="connsiteX103" y="connsiteY103"/>
+              </a:cxn>
+              <a:cxn ang="0">
+                <a:pos x="connsiteX104" y="connsiteY104"/>
+              </a:cxn>
+              <a:cxn ang="0">
+                <a:pos x="connsiteX105" y="connsiteY105"/>
+              </a:cxn>
+              <a:cxn ang="0">
+                <a:pos x="connsiteX106" y="connsiteY106"/>
+              </a:cxn>
+              <a:cxn ang="0">
+                <a:pos x="connsiteX107" y="connsiteY107"/>
+              </a:cxn>
+              <a:cxn ang="0">
+                <a:pos x="connsiteX108" y="connsiteY108"/>
+              </a:cxn>
+              <a:cxn ang="0">
+                <a:pos x="connsiteX109" y="connsiteY109"/>
+              </a:cxn>
+              <a:cxn ang="0">
+                <a:pos x="connsiteX110" y="connsiteY110"/>
+              </a:cxn>
+              <a:cxn ang="0">
+                <a:pos x="connsiteX111" y="connsiteY111"/>
+              </a:cxn>
+              <a:cxn ang="0">
+                <a:pos x="connsiteX112" y="connsiteY112"/>
+              </a:cxn>
+              <a:cxn ang="0">
+                <a:pos x="connsiteX113" y="connsiteY113"/>
+              </a:cxn>
+              <a:cxn ang="0">
+                <a:pos x="connsiteX114" y="connsiteY114"/>
+              </a:cxn>
+              <a:cxn ang="0">
+                <a:pos x="connsiteX115" y="connsiteY115"/>
+              </a:cxn>
+              <a:cxn ang="0">
+                <a:pos x="connsiteX116" y="connsiteY116"/>
+              </a:cxn>
+              <a:cxn ang="0">
+                <a:pos x="connsiteX117" y="connsiteY117"/>
+              </a:cxn>
+              <a:cxn ang="0">
+                <a:pos x="connsiteX118" y="connsiteY118"/>
+              </a:cxn>
+              <a:cxn ang="0">
+                <a:pos x="connsiteX119" y="connsiteY119"/>
+              </a:cxn>
+              <a:cxn ang="0">
+                <a:pos x="connsiteX120" y="connsiteY120"/>
+              </a:cxn>
+              <a:cxn ang="0">
+                <a:pos x="connsiteX121" y="connsiteY121"/>
+              </a:cxn>
+              <a:cxn ang="0">
+                <a:pos x="connsiteX122" y="connsiteY122"/>
+              </a:cxn>
+              <a:cxn ang="0">
+                <a:pos x="connsiteX123" y="connsiteY123"/>
+              </a:cxn>
+              <a:cxn ang="0">
+                <a:pos x="connsiteX124" y="connsiteY124"/>
+              </a:cxn>
+            </a:cxnLst>
+            <a:rect l="l" t="t" r="r" b="b"/>
+            <a:pathLst>
+              <a:path w="6202017" h="4280452">
+                <a:moveTo>
+                  <a:pt x="2703443" y="569844"/>
+                </a:moveTo>
+                <a:lnTo>
+                  <a:pt x="2703443" y="569844"/>
+                </a:lnTo>
+                <a:cubicBezTo>
+                  <a:pt x="2712278" y="516835"/>
+                  <a:pt x="2712062" y="461494"/>
+                  <a:pt x="2729948" y="410818"/>
+                </a:cubicBezTo>
+                <a:cubicBezTo>
+                  <a:pt x="2739362" y="384146"/>
+                  <a:pt x="2760185" y="361336"/>
+                  <a:pt x="2782956" y="344557"/>
+                </a:cubicBezTo>
+                <a:cubicBezTo>
+                  <a:pt x="3014258" y="174123"/>
+                  <a:pt x="2906168" y="259312"/>
+                  <a:pt x="3087756" y="198783"/>
+                </a:cubicBezTo>
+                <a:cubicBezTo>
+                  <a:pt x="3119672" y="188144"/>
+                  <a:pt x="3148606" y="169665"/>
+                  <a:pt x="3180522" y="159026"/>
+                </a:cubicBezTo>
+                <a:cubicBezTo>
+                  <a:pt x="3270142" y="129153"/>
+                  <a:pt x="3290523" y="134067"/>
+                  <a:pt x="3379304" y="119270"/>
+                </a:cubicBezTo>
+                <a:cubicBezTo>
+                  <a:pt x="3401522" y="115567"/>
+                  <a:pt x="3423617" y="111083"/>
+                  <a:pt x="3445565" y="106018"/>
+                </a:cubicBezTo>
+                <a:cubicBezTo>
+                  <a:pt x="3481059" y="97827"/>
+                  <a:pt x="3515651" y="85501"/>
+                  <a:pt x="3551582" y="79513"/>
+                </a:cubicBezTo>
+                <a:cubicBezTo>
+                  <a:pt x="3578086" y="75096"/>
+                  <a:pt x="3604747" y="71531"/>
+                  <a:pt x="3631095" y="66261"/>
+                </a:cubicBezTo>
+                <a:cubicBezTo>
+                  <a:pt x="3694538" y="53573"/>
+                  <a:pt x="3683707" y="51502"/>
+                  <a:pt x="3750365" y="26505"/>
+                </a:cubicBezTo>
+                <a:cubicBezTo>
+                  <a:pt x="3788396" y="12243"/>
+                  <a:pt x="3801348" y="10445"/>
+                  <a:pt x="3843130" y="0"/>
+                </a:cubicBezTo>
+                <a:cubicBezTo>
+                  <a:pt x="3944730" y="4417"/>
+                  <a:pt x="4046904" y="1595"/>
+                  <a:pt x="4147930" y="13252"/>
+                </a:cubicBezTo>
+                <a:cubicBezTo>
+                  <a:pt x="4163752" y="15078"/>
+                  <a:pt x="4173441" y="32634"/>
+                  <a:pt x="4187687" y="39757"/>
+                </a:cubicBezTo>
+                <a:cubicBezTo>
+                  <a:pt x="4200181" y="46004"/>
+                  <a:pt x="4214191" y="48592"/>
+                  <a:pt x="4227443" y="53009"/>
+                </a:cubicBezTo>
+                <a:cubicBezTo>
+                  <a:pt x="4279040" y="104604"/>
+                  <a:pt x="4234069" y="70236"/>
+                  <a:pt x="4346713" y="92765"/>
+                </a:cubicBezTo>
+                <a:cubicBezTo>
+                  <a:pt x="4382432" y="99909"/>
+                  <a:pt x="4418173" y="107751"/>
+                  <a:pt x="4452730" y="119270"/>
+                </a:cubicBezTo>
+                <a:cubicBezTo>
+                  <a:pt x="4465982" y="123687"/>
+                  <a:pt x="4478743" y="130023"/>
+                  <a:pt x="4492487" y="132522"/>
+                </a:cubicBezTo>
+                <a:cubicBezTo>
+                  <a:pt x="4559672" y="144737"/>
+                  <a:pt x="4699846" y="154219"/>
+                  <a:pt x="4757530" y="159026"/>
+                </a:cubicBezTo>
+                <a:cubicBezTo>
+                  <a:pt x="4883694" y="222108"/>
+                  <a:pt x="4824805" y="204286"/>
+                  <a:pt x="4929809" y="225287"/>
+                </a:cubicBezTo>
+                <a:cubicBezTo>
+                  <a:pt x="4984708" y="261888"/>
+                  <a:pt x="4964494" y="242041"/>
+                  <a:pt x="5009322" y="304800"/>
+                </a:cubicBezTo>
+                <a:cubicBezTo>
+                  <a:pt x="5018580" y="317760"/>
+                  <a:pt x="5023389" y="334607"/>
+                  <a:pt x="5035826" y="344557"/>
+                </a:cubicBezTo>
+                <a:cubicBezTo>
+                  <a:pt x="5046734" y="353283"/>
+                  <a:pt x="5062503" y="352904"/>
+                  <a:pt x="5075582" y="357809"/>
+                </a:cubicBezTo>
+                <a:cubicBezTo>
+                  <a:pt x="5097856" y="366162"/>
+                  <a:pt x="5120187" y="374469"/>
+                  <a:pt x="5141843" y="384313"/>
+                </a:cubicBezTo>
+                <a:cubicBezTo>
+                  <a:pt x="5281646" y="447860"/>
+                  <a:pt x="5166673" y="400276"/>
+                  <a:pt x="5327374" y="503583"/>
+                </a:cubicBezTo>
+                <a:cubicBezTo>
+                  <a:pt x="5352300" y="519607"/>
+                  <a:pt x="5382864" y="525989"/>
+                  <a:pt x="5406887" y="543339"/>
+                </a:cubicBezTo>
+                <a:cubicBezTo>
+                  <a:pt x="5462825" y="583739"/>
+                  <a:pt x="5517122" y="627069"/>
+                  <a:pt x="5565913" y="675861"/>
+                </a:cubicBezTo>
+                <a:cubicBezTo>
+                  <a:pt x="5579165" y="689113"/>
+                  <a:pt x="5589776" y="705685"/>
+                  <a:pt x="5605669" y="715618"/>
+                </a:cubicBezTo>
+                <a:cubicBezTo>
+                  <a:pt x="5625841" y="728226"/>
+                  <a:pt x="5649843" y="733287"/>
+                  <a:pt x="5671930" y="742122"/>
+                </a:cubicBezTo>
+                <a:cubicBezTo>
+                  <a:pt x="5701773" y="831650"/>
+                  <a:pt x="5660385" y="734608"/>
+                  <a:pt x="5724939" y="808383"/>
+                </a:cubicBezTo>
+                <a:cubicBezTo>
+                  <a:pt x="5745915" y="832356"/>
+                  <a:pt x="5758049" y="863022"/>
+                  <a:pt x="5777948" y="887896"/>
+                </a:cubicBezTo>
+                <a:cubicBezTo>
+                  <a:pt x="5840905" y="966594"/>
+                  <a:pt x="5815266" y="930623"/>
+                  <a:pt x="5857461" y="993913"/>
+                </a:cubicBezTo>
+                <a:cubicBezTo>
+                  <a:pt x="5861878" y="1007165"/>
+                  <a:pt x="5863929" y="1021459"/>
+                  <a:pt x="5870713" y="1033670"/>
+                </a:cubicBezTo>
+                <a:cubicBezTo>
+                  <a:pt x="5886183" y="1061516"/>
+                  <a:pt x="5923722" y="1113183"/>
+                  <a:pt x="5923722" y="1113183"/>
+                </a:cubicBezTo>
+                <a:cubicBezTo>
+                  <a:pt x="5930447" y="1140084"/>
+                  <a:pt x="5938819" y="1179330"/>
+                  <a:pt x="5950226" y="1205948"/>
+                </a:cubicBezTo>
+                <a:cubicBezTo>
+                  <a:pt x="5958008" y="1224106"/>
+                  <a:pt x="5967895" y="1241287"/>
+                  <a:pt x="5976730" y="1258957"/>
+                </a:cubicBezTo>
+                <a:cubicBezTo>
+                  <a:pt x="5981147" y="1281044"/>
+                  <a:pt x="5982859" y="1303850"/>
+                  <a:pt x="5989982" y="1325218"/>
+                </a:cubicBezTo>
+                <a:cubicBezTo>
+                  <a:pt x="5996229" y="1343959"/>
+                  <a:pt x="6008705" y="1360068"/>
+                  <a:pt x="6016487" y="1378226"/>
+                </a:cubicBezTo>
+                <a:cubicBezTo>
+                  <a:pt x="6021990" y="1391066"/>
+                  <a:pt x="6024236" y="1405143"/>
+                  <a:pt x="6029739" y="1417983"/>
+                </a:cubicBezTo>
+                <a:cubicBezTo>
+                  <a:pt x="6037521" y="1436141"/>
+                  <a:pt x="6048906" y="1452650"/>
+                  <a:pt x="6056243" y="1470992"/>
+                </a:cubicBezTo>
+                <a:cubicBezTo>
+                  <a:pt x="6056265" y="1471046"/>
+                  <a:pt x="6109231" y="1629963"/>
+                  <a:pt x="6109252" y="1630018"/>
+                </a:cubicBezTo>
+                <a:cubicBezTo>
+                  <a:pt x="6122504" y="1665357"/>
+                  <a:pt x="6137751" y="1700011"/>
+                  <a:pt x="6149009" y="1736035"/>
+                </a:cubicBezTo>
+                <a:cubicBezTo>
+                  <a:pt x="6159874" y="1770803"/>
+                  <a:pt x="6166678" y="1806713"/>
+                  <a:pt x="6175513" y="1842052"/>
+                </a:cubicBezTo>
+                <a:cubicBezTo>
+                  <a:pt x="6194227" y="1916911"/>
+                  <a:pt x="6185194" y="1877204"/>
+                  <a:pt x="6202017" y="1961322"/>
+                </a:cubicBezTo>
+                <a:cubicBezTo>
+                  <a:pt x="6197600" y="2093844"/>
+                  <a:pt x="6195734" y="2226475"/>
+                  <a:pt x="6188765" y="2358887"/>
+                </a:cubicBezTo>
+                <a:cubicBezTo>
+                  <a:pt x="6186893" y="2394452"/>
+                  <a:pt x="6183521" y="2430203"/>
+                  <a:pt x="6175513" y="2464905"/>
+                </a:cubicBezTo>
+                <a:cubicBezTo>
+                  <a:pt x="6168695" y="2494450"/>
+                  <a:pt x="6145063" y="2545857"/>
+                  <a:pt x="6122504" y="2570922"/>
+                </a:cubicBezTo>
+                <a:cubicBezTo>
+                  <a:pt x="6093250" y="2603426"/>
+                  <a:pt x="6060661" y="2632765"/>
+                  <a:pt x="6029739" y="2663687"/>
+                </a:cubicBezTo>
+                <a:cubicBezTo>
+                  <a:pt x="5828027" y="2865399"/>
+                  <a:pt x="6135849" y="2563824"/>
+                  <a:pt x="5857461" y="2809461"/>
+                </a:cubicBezTo>
+                <a:cubicBezTo>
+                  <a:pt x="5815302" y="2846660"/>
+                  <a:pt x="5780303" y="2891478"/>
+                  <a:pt x="5738191" y="2928731"/>
+                </a:cubicBezTo>
+                <a:cubicBezTo>
+                  <a:pt x="5618248" y="3034834"/>
+                  <a:pt x="5507756" y="3102597"/>
+                  <a:pt x="5406887" y="3220278"/>
+                </a:cubicBezTo>
+                <a:cubicBezTo>
+                  <a:pt x="5366934" y="3266890"/>
+                  <a:pt x="5320907" y="3370903"/>
+                  <a:pt x="5274365" y="3405809"/>
+                </a:cubicBezTo>
+                <a:cubicBezTo>
+                  <a:pt x="5222099" y="3445007"/>
+                  <a:pt x="5200583" y="3457240"/>
+                  <a:pt x="5155095" y="3511826"/>
+                </a:cubicBezTo>
+                <a:cubicBezTo>
+                  <a:pt x="5133008" y="3538330"/>
+                  <a:pt x="5112043" y="3565810"/>
+                  <a:pt x="5088835" y="3591339"/>
+                </a:cubicBezTo>
+                <a:cubicBezTo>
+                  <a:pt x="5067824" y="3614452"/>
+                  <a:pt x="5040946" y="3632339"/>
+                  <a:pt x="5022574" y="3657600"/>
+                </a:cubicBezTo>
+                <a:cubicBezTo>
+                  <a:pt x="5005145" y="3681565"/>
+                  <a:pt x="4999254" y="3712457"/>
+                  <a:pt x="4982817" y="3737113"/>
+                </a:cubicBezTo>
+                <a:cubicBezTo>
+                  <a:pt x="4972421" y="3752707"/>
+                  <a:pt x="4955059" y="3762472"/>
+                  <a:pt x="4943061" y="3776870"/>
+                </a:cubicBezTo>
+                <a:cubicBezTo>
+                  <a:pt x="4932865" y="3789106"/>
+                  <a:pt x="4927044" y="3804640"/>
+                  <a:pt x="4916556" y="3816626"/>
+                </a:cubicBezTo>
+                <a:cubicBezTo>
+                  <a:pt x="4895987" y="3840133"/>
+                  <a:pt x="4871191" y="3859670"/>
+                  <a:pt x="4850295" y="3882887"/>
+                </a:cubicBezTo>
+                <a:cubicBezTo>
+                  <a:pt x="4831373" y="3903911"/>
+                  <a:pt x="4815913" y="3927861"/>
+                  <a:pt x="4797287" y="3949148"/>
+                </a:cubicBezTo>
+                <a:cubicBezTo>
+                  <a:pt x="4784946" y="3963253"/>
+                  <a:pt x="4769727" y="3974675"/>
+                  <a:pt x="4757530" y="3988905"/>
+                </a:cubicBezTo>
+                <a:cubicBezTo>
+                  <a:pt x="4743156" y="4005674"/>
+                  <a:pt x="4730612" y="4023940"/>
+                  <a:pt x="4717774" y="4041913"/>
+                </a:cubicBezTo>
+                <a:cubicBezTo>
+                  <a:pt x="4708516" y="4054874"/>
+                  <a:pt x="4702531" y="4070408"/>
+                  <a:pt x="4691269" y="4081670"/>
+                </a:cubicBezTo>
+                <a:cubicBezTo>
+                  <a:pt x="4680007" y="4092932"/>
+                  <a:pt x="4664255" y="4098618"/>
+                  <a:pt x="4651513" y="4108174"/>
+                </a:cubicBezTo>
+                <a:cubicBezTo>
+                  <a:pt x="4628885" y="4125145"/>
+                  <a:pt x="4609978" y="4147447"/>
+                  <a:pt x="4585252" y="4161183"/>
+                </a:cubicBezTo>
+                <a:cubicBezTo>
+                  <a:pt x="4569331" y="4170028"/>
+                  <a:pt x="4549815" y="4169643"/>
+                  <a:pt x="4532243" y="4174435"/>
+                </a:cubicBezTo>
+                <a:cubicBezTo>
+                  <a:pt x="4501217" y="4182896"/>
+                  <a:pt x="4470677" y="4193139"/>
+                  <a:pt x="4439478" y="4200939"/>
+                </a:cubicBezTo>
+                <a:cubicBezTo>
+                  <a:pt x="4383477" y="4214939"/>
+                  <a:pt x="4338812" y="4218466"/>
+                  <a:pt x="4280452" y="4227444"/>
+                </a:cubicBezTo>
+                <a:cubicBezTo>
+                  <a:pt x="4253895" y="4231530"/>
+                  <a:pt x="4227121" y="4234654"/>
+                  <a:pt x="4200939" y="4240696"/>
+                </a:cubicBezTo>
+                <a:cubicBezTo>
+                  <a:pt x="4169604" y="4247927"/>
+                  <a:pt x="4139200" y="4258739"/>
+                  <a:pt x="4108174" y="4267200"/>
+                </a:cubicBezTo>
+                <a:cubicBezTo>
+                  <a:pt x="4090602" y="4271992"/>
+                  <a:pt x="4072835" y="4276035"/>
+                  <a:pt x="4055165" y="4280452"/>
+                </a:cubicBezTo>
+                <a:lnTo>
+                  <a:pt x="2504661" y="4267200"/>
+                </a:lnTo>
+                <a:cubicBezTo>
+                  <a:pt x="2482166" y="4266056"/>
+                  <a:pt x="2507336" y="4216866"/>
+                  <a:pt x="2491409" y="4200939"/>
+                </a:cubicBezTo>
+                <a:cubicBezTo>
+                  <a:pt x="2471654" y="4181184"/>
+                  <a:pt x="2437835" y="4184811"/>
+                  <a:pt x="2411895" y="4174435"/>
+                </a:cubicBezTo>
+                <a:cubicBezTo>
+                  <a:pt x="2393553" y="4167098"/>
+                  <a:pt x="2377229" y="4155268"/>
+                  <a:pt x="2358887" y="4147931"/>
+                </a:cubicBezTo>
+                <a:cubicBezTo>
+                  <a:pt x="2332947" y="4137555"/>
+                  <a:pt x="2305314" y="4131802"/>
+                  <a:pt x="2279374" y="4121426"/>
+                </a:cubicBezTo>
+                <a:cubicBezTo>
+                  <a:pt x="2238979" y="4105268"/>
+                  <a:pt x="2200840" y="4083694"/>
+                  <a:pt x="2160104" y="4068418"/>
+                </a:cubicBezTo>
+                <a:cubicBezTo>
+                  <a:pt x="2059383" y="4030648"/>
+                  <a:pt x="1955704" y="4001016"/>
+                  <a:pt x="1855304" y="3962400"/>
+                </a:cubicBezTo>
+                <a:cubicBezTo>
+                  <a:pt x="1797878" y="3940313"/>
+                  <a:pt x="1742274" y="3912729"/>
+                  <a:pt x="1683026" y="3896139"/>
+                </a:cubicBezTo>
+                <a:cubicBezTo>
+                  <a:pt x="1631276" y="3881649"/>
+                  <a:pt x="1576610" y="3880595"/>
+                  <a:pt x="1524000" y="3869635"/>
+                </a:cubicBezTo>
+                <a:cubicBezTo>
+                  <a:pt x="1470508" y="3858491"/>
+                  <a:pt x="1417512" y="3844889"/>
+                  <a:pt x="1364974" y="3829878"/>
+                </a:cubicBezTo>
+                <a:cubicBezTo>
+                  <a:pt x="1324679" y="3818365"/>
+                  <a:pt x="1285222" y="3804070"/>
+                  <a:pt x="1245704" y="3790122"/>
+                </a:cubicBezTo>
+                <a:cubicBezTo>
+                  <a:pt x="1210114" y="3777561"/>
+                  <a:pt x="1176155" y="3760090"/>
+                  <a:pt x="1139687" y="3750365"/>
+                </a:cubicBezTo>
+                <a:cubicBezTo>
+                  <a:pt x="1109506" y="3742317"/>
+                  <a:pt x="1077844" y="3741530"/>
+                  <a:pt x="1046922" y="3737113"/>
+                </a:cubicBezTo>
+                <a:cubicBezTo>
+                  <a:pt x="901644" y="3664475"/>
+                  <a:pt x="1036617" y="3721484"/>
+                  <a:pt x="874643" y="3684105"/>
+                </a:cubicBezTo>
+                <a:cubicBezTo>
+                  <a:pt x="828873" y="3673543"/>
+                  <a:pt x="741747" y="3636597"/>
+                  <a:pt x="702365" y="3617844"/>
+                </a:cubicBezTo>
+                <a:cubicBezTo>
+                  <a:pt x="639938" y="3588117"/>
+                  <a:pt x="576868" y="3559382"/>
+                  <a:pt x="516835" y="3525078"/>
+                </a:cubicBezTo>
+                <a:cubicBezTo>
+                  <a:pt x="485913" y="3507409"/>
+                  <a:pt x="454400" y="3490735"/>
+                  <a:pt x="424069" y="3472070"/>
+                </a:cubicBezTo>
+                <a:cubicBezTo>
+                  <a:pt x="396940" y="3455375"/>
+                  <a:pt x="373047" y="3433307"/>
+                  <a:pt x="344556" y="3419061"/>
+                </a:cubicBezTo>
+                <a:cubicBezTo>
+                  <a:pt x="319568" y="3406567"/>
+                  <a:pt x="291547" y="3401392"/>
+                  <a:pt x="265043" y="3392557"/>
+                </a:cubicBezTo>
+                <a:cubicBezTo>
+                  <a:pt x="238539" y="3374887"/>
+                  <a:pt x="208054" y="3362072"/>
+                  <a:pt x="185530" y="3339548"/>
+                </a:cubicBezTo>
+                <a:lnTo>
+                  <a:pt x="119269" y="3273287"/>
+                </a:lnTo>
+                <a:cubicBezTo>
+                  <a:pt x="91849" y="3191028"/>
+                  <a:pt x="81438" y="3161713"/>
+                  <a:pt x="53009" y="3048000"/>
+                </a:cubicBezTo>
+                <a:cubicBezTo>
+                  <a:pt x="44174" y="3012661"/>
+                  <a:pt x="36511" y="2977008"/>
+                  <a:pt x="26504" y="2941983"/>
+                </a:cubicBezTo>
+                <a:lnTo>
+                  <a:pt x="0" y="2849218"/>
+                </a:lnTo>
+                <a:cubicBezTo>
+                  <a:pt x="22087" y="2699027"/>
+                  <a:pt x="21825" y="2543802"/>
+                  <a:pt x="66261" y="2398644"/>
+                </a:cubicBezTo>
+                <a:cubicBezTo>
+                  <a:pt x="89571" y="2322496"/>
+                  <a:pt x="173597" y="2275409"/>
+                  <a:pt x="198782" y="2199861"/>
+                </a:cubicBezTo>
+                <a:cubicBezTo>
+                  <a:pt x="213650" y="2155261"/>
+                  <a:pt x="212340" y="2152946"/>
+                  <a:pt x="238539" y="2107096"/>
+                </a:cubicBezTo>
+                <a:cubicBezTo>
+                  <a:pt x="246441" y="2093267"/>
+                  <a:pt x="254678" y="2079432"/>
+                  <a:pt x="265043" y="2067339"/>
+                </a:cubicBezTo>
+                <a:cubicBezTo>
+                  <a:pt x="281305" y="2048366"/>
+                  <a:pt x="302710" y="2034056"/>
+                  <a:pt x="318052" y="2014331"/>
+                </a:cubicBezTo>
+                <a:cubicBezTo>
+                  <a:pt x="333866" y="1993999"/>
+                  <a:pt x="340697" y="1967322"/>
+                  <a:pt x="357809" y="1948070"/>
+                </a:cubicBezTo>
+                <a:cubicBezTo>
+                  <a:pt x="376600" y="1926930"/>
+                  <a:pt x="404069" y="1915061"/>
+                  <a:pt x="424069" y="1895061"/>
+                </a:cubicBezTo>
+                <a:cubicBezTo>
+                  <a:pt x="451149" y="1867981"/>
+                  <a:pt x="444298" y="1848468"/>
+                  <a:pt x="477078" y="1828800"/>
+                </a:cubicBezTo>
+                <a:cubicBezTo>
+                  <a:pt x="489056" y="1821613"/>
+                  <a:pt x="503358" y="1819223"/>
+                  <a:pt x="516835" y="1815548"/>
+                </a:cubicBezTo>
+                <a:cubicBezTo>
+                  <a:pt x="551978" y="1805964"/>
+                  <a:pt x="587513" y="1797879"/>
+                  <a:pt x="622852" y="1789044"/>
+                </a:cubicBezTo>
+                <a:cubicBezTo>
+                  <a:pt x="640522" y="1780209"/>
+                  <a:pt x="657703" y="1770321"/>
+                  <a:pt x="675861" y="1762539"/>
+                </a:cubicBezTo>
+                <a:cubicBezTo>
+                  <a:pt x="732918" y="1738085"/>
+                  <a:pt x="726056" y="1759418"/>
+                  <a:pt x="795130" y="1709531"/>
+                </a:cubicBezTo>
+                <a:cubicBezTo>
+                  <a:pt x="851068" y="1669131"/>
+                  <a:pt x="905364" y="1625801"/>
+                  <a:pt x="954156" y="1577009"/>
+                </a:cubicBezTo>
+                <a:cubicBezTo>
+                  <a:pt x="978640" y="1552525"/>
+                  <a:pt x="1000869" y="1525098"/>
+                  <a:pt x="1033669" y="1510748"/>
+                </a:cubicBezTo>
+                <a:cubicBezTo>
+                  <a:pt x="1246573" y="1417603"/>
+                  <a:pt x="1139264" y="1465432"/>
+                  <a:pt x="1258956" y="1431235"/>
+                </a:cubicBezTo>
+                <a:cubicBezTo>
+                  <a:pt x="1421060" y="1384920"/>
+                  <a:pt x="1139699" y="1462154"/>
+                  <a:pt x="1351722" y="1391478"/>
+                </a:cubicBezTo>
+                <a:cubicBezTo>
+                  <a:pt x="1373090" y="1384355"/>
+                  <a:pt x="1396130" y="1383689"/>
+                  <a:pt x="1417982" y="1378226"/>
+                </a:cubicBezTo>
+                <a:cubicBezTo>
+                  <a:pt x="1545337" y="1346387"/>
+                  <a:pt x="1299296" y="1380818"/>
+                  <a:pt x="1590261" y="1351722"/>
+                </a:cubicBezTo>
+                <a:cubicBezTo>
+                  <a:pt x="1759434" y="1250217"/>
+                  <a:pt x="1550034" y="1379881"/>
+                  <a:pt x="1722782" y="1258957"/>
+                </a:cubicBezTo>
+                <a:cubicBezTo>
+                  <a:pt x="1819368" y="1191347"/>
+                  <a:pt x="1757700" y="1241965"/>
+                  <a:pt x="1868556" y="1192696"/>
+                </a:cubicBezTo>
+                <a:cubicBezTo>
+                  <a:pt x="2093963" y="1092515"/>
+                  <a:pt x="1954692" y="1131405"/>
+                  <a:pt x="2080591" y="1099931"/>
+                </a:cubicBezTo>
+                <a:cubicBezTo>
+                  <a:pt x="2093843" y="1086679"/>
+                  <a:pt x="2105355" y="1071419"/>
+                  <a:pt x="2120348" y="1060174"/>
+                </a:cubicBezTo>
+                <a:cubicBezTo>
+                  <a:pt x="2216498" y="988062"/>
+                  <a:pt x="2226371" y="1033664"/>
+                  <a:pt x="2345635" y="914400"/>
+                </a:cubicBezTo>
+                <a:cubicBezTo>
+                  <a:pt x="2363304" y="896731"/>
+                  <a:pt x="2379130" y="877002"/>
+                  <a:pt x="2398643" y="861392"/>
+                </a:cubicBezTo>
+                <a:cubicBezTo>
+                  <a:pt x="2423517" y="841493"/>
+                  <a:pt x="2455632" y="830907"/>
+                  <a:pt x="2478156" y="808383"/>
+                </a:cubicBezTo>
+                <a:cubicBezTo>
+                  <a:pt x="2529175" y="757364"/>
+                  <a:pt x="2502319" y="779022"/>
+                  <a:pt x="2557669" y="742122"/>
+                </a:cubicBezTo>
+                <a:cubicBezTo>
+                  <a:pt x="2566504" y="728870"/>
+                  <a:pt x="2570668" y="710806"/>
+                  <a:pt x="2584174" y="702365"/>
+                </a:cubicBezTo>
+                <a:cubicBezTo>
+                  <a:pt x="2607865" y="687558"/>
+                  <a:pt x="2663687" y="675861"/>
+                  <a:pt x="2663687" y="675861"/>
+                </a:cubicBezTo>
+                <a:cubicBezTo>
+                  <a:pt x="2673123" y="647553"/>
+                  <a:pt x="2688024" y="583096"/>
+                  <a:pt x="2729948" y="583096"/>
+                </a:cubicBezTo>
+                <a:lnTo>
+                  <a:pt x="2703443" y="569844"/>
+                </a:lnTo>
+                <a:close/>
+              </a:path>
+            </a:pathLst>
+          </a:custGeom>
+          <a:ln>
+            <a:noFill/>
+          </a:ln>
+        </p:spPr>
+        <p:style>
+          <a:lnRef idx="2">
+            <a:schemeClr val="accent1">
+              <a:shade val="50000"/>
+            </a:schemeClr>
+          </a:lnRef>
+          <a:fillRef idx="1">
+            <a:schemeClr val="accent1"/>
+          </a:fillRef>
+          <a:effectRef idx="0">
+            <a:schemeClr val="accent1"/>
+          </a:effectRef>
+          <a:fontRef idx="minor">
+            <a:schemeClr val="lt1"/>
+          </a:fontRef>
+        </p:style>
+        <p:txBody>
+          <a:bodyPr rtlCol="0" anchor="ctr"/>
+          <a:lstStyle/>
+          <a:p>
+            <a:pPr algn="ctr"/>
+            <a:r>
+              <a:rPr lang="en-GB" sz="3200" dirty="0"/>
+              <a:t>sample</a:t>
+            </a:r>
+            <a:endParaRPr lang="en-US" sz="3200" dirty="0"/>
+          </a:p>
+        </p:txBody>
+      </p:sp>
+      <p:sp>
+        <p:nvSpPr>
+          <p:cNvPr id="4" name="Rectangle 3">
+            <a:extLst>
+              <a:ext uri="{FF2B5EF4-FFF2-40B4-BE49-F238E27FC236}">
+                <a16:creationId xmlns:a16="http://schemas.microsoft.com/office/drawing/2014/main" id="{5DCE5308-7458-4C12-9E8B-5CBF8C39383D}"/>
+              </a:ext>
+            </a:extLst>
+          </p:cNvPr>
+          <p:cNvSpPr/>
+          <p:nvPr/>
+        </p:nvSpPr>
+        <p:spPr>
+          <a:xfrm>
+            <a:off x="2478157" y="4876799"/>
+            <a:ext cx="463826" cy="460513"/>
+          </a:xfrm>
+          <a:prstGeom prst="rect">
+            <a:avLst/>
+          </a:prstGeom>
+          <a:solidFill>
+            <a:srgbClr val="EA621F"/>
+          </a:solidFill>
+          <a:ln>
+            <a:noFill/>
+          </a:ln>
+        </p:spPr>
+        <p:style>
+          <a:lnRef idx="2">
+            <a:schemeClr val="accent1">
+              <a:shade val="50000"/>
+            </a:schemeClr>
+          </a:lnRef>
+          <a:fillRef idx="1">
+            <a:schemeClr val="accent1"/>
+          </a:fillRef>
+          <a:effectRef idx="0">
+            <a:schemeClr val="accent1"/>
+          </a:effectRef>
+          <a:fontRef idx="minor">
+            <a:schemeClr val="lt1"/>
+          </a:fontRef>
+        </p:style>
+        <p:txBody>
+          <a:bodyPr rtlCol="0" anchor="ctr"/>
+          <a:lstStyle/>
+          <a:p>
+            <a:pPr algn="ctr"/>
+            <a:r>
+              <a:rPr lang="en-GB" sz="2400" dirty="0"/>
+              <a:t>1</a:t>
+            </a:r>
+            <a:endParaRPr lang="en-US" sz="2400" dirty="0"/>
+          </a:p>
+        </p:txBody>
+      </p:sp>
+      <p:sp>
+        <p:nvSpPr>
+          <p:cNvPr id="5" name="Rectangle 4">
+            <a:extLst>
+              <a:ext uri="{FF2B5EF4-FFF2-40B4-BE49-F238E27FC236}">
+                <a16:creationId xmlns:a16="http://schemas.microsoft.com/office/drawing/2014/main" id="{2E211316-C15F-4398-8E43-D0AA53D7B27E}"/>
+              </a:ext>
+            </a:extLst>
+          </p:cNvPr>
+          <p:cNvSpPr/>
+          <p:nvPr/>
+        </p:nvSpPr>
+        <p:spPr>
+          <a:xfrm>
+            <a:off x="6202019" y="4757529"/>
+            <a:ext cx="463826" cy="460513"/>
+          </a:xfrm>
+          <a:prstGeom prst="rect">
+            <a:avLst/>
+          </a:prstGeom>
+          <a:solidFill>
+            <a:srgbClr val="EA621F"/>
+          </a:solidFill>
+          <a:ln>
+            <a:noFill/>
+          </a:ln>
+        </p:spPr>
+        <p:style>
+          <a:lnRef idx="2">
+            <a:schemeClr val="accent1">
+              <a:shade val="50000"/>
+            </a:schemeClr>
+          </a:lnRef>
+          <a:fillRef idx="1">
+            <a:schemeClr val="accent1"/>
+          </a:fillRef>
+          <a:effectRef idx="0">
+            <a:schemeClr val="accent1"/>
+          </a:effectRef>
+          <a:fontRef idx="minor">
+            <a:schemeClr val="lt1"/>
+          </a:fontRef>
+        </p:style>
+        <p:txBody>
+          <a:bodyPr rtlCol="0" anchor="ctr"/>
+          <a:lstStyle/>
+          <a:p>
+            <a:pPr algn="ctr"/>
+            <a:r>
+              <a:rPr lang="en-GB" sz="2400" dirty="0"/>
+              <a:t>2</a:t>
+            </a:r>
+            <a:endParaRPr lang="en-US" sz="2400" dirty="0"/>
+          </a:p>
+        </p:txBody>
+      </p:sp>
+      <p:sp>
+        <p:nvSpPr>
+          <p:cNvPr id="6" name="Rectangle 5">
+            <a:extLst>
+              <a:ext uri="{FF2B5EF4-FFF2-40B4-BE49-F238E27FC236}">
+                <a16:creationId xmlns:a16="http://schemas.microsoft.com/office/drawing/2014/main" id="{CB31CAFE-0CED-4976-BEED-8066AC3A85CF}"/>
+              </a:ext>
+            </a:extLst>
+          </p:cNvPr>
+          <p:cNvSpPr/>
+          <p:nvPr/>
+        </p:nvSpPr>
+        <p:spPr>
+          <a:xfrm>
+            <a:off x="3326297" y="2080590"/>
+            <a:ext cx="463826" cy="460513"/>
+          </a:xfrm>
+          <a:prstGeom prst="rect">
+            <a:avLst/>
+          </a:prstGeom>
+          <a:solidFill>
+            <a:srgbClr val="EA621F"/>
+          </a:solidFill>
+          <a:ln>
+            <a:noFill/>
+          </a:ln>
+        </p:spPr>
+        <p:style>
+          <a:lnRef idx="2">
+            <a:schemeClr val="accent1">
+              <a:shade val="50000"/>
+            </a:schemeClr>
+          </a:lnRef>
+          <a:fillRef idx="1">
+            <a:schemeClr val="accent1"/>
+          </a:fillRef>
+          <a:effectRef idx="0">
+            <a:schemeClr val="accent1"/>
+          </a:effectRef>
+          <a:fontRef idx="minor">
+            <a:schemeClr val="lt1"/>
+          </a:fontRef>
+        </p:style>
+        <p:txBody>
+          <a:bodyPr rtlCol="0" anchor="ctr"/>
+          <a:lstStyle/>
+          <a:p>
+            <a:pPr algn="ctr"/>
+            <a:r>
+              <a:rPr lang="en-GB" sz="2400" dirty="0"/>
+              <a:t>3</a:t>
+            </a:r>
+            <a:endParaRPr lang="en-US" sz="2400" dirty="0"/>
+          </a:p>
+        </p:txBody>
+      </p:sp>
+      <p:sp>
+        <p:nvSpPr>
+          <p:cNvPr id="7" name="Rectangle 6">
+            <a:extLst>
+              <a:ext uri="{FF2B5EF4-FFF2-40B4-BE49-F238E27FC236}">
+                <a16:creationId xmlns:a16="http://schemas.microsoft.com/office/drawing/2014/main" id="{3B140140-BCDD-49A1-AF01-A47C53DD85C7}"/>
+              </a:ext>
+            </a:extLst>
+          </p:cNvPr>
+          <p:cNvSpPr/>
+          <p:nvPr/>
+        </p:nvSpPr>
+        <p:spPr>
+          <a:xfrm>
+            <a:off x="6433932" y="1633328"/>
+            <a:ext cx="463826" cy="460513"/>
+          </a:xfrm>
+          <a:prstGeom prst="rect">
+            <a:avLst/>
+          </a:prstGeom>
+          <a:solidFill>
+            <a:srgbClr val="EA621F"/>
+          </a:solidFill>
+          <a:ln>
+            <a:noFill/>
+          </a:ln>
+        </p:spPr>
+        <p:style>
+          <a:lnRef idx="2">
+            <a:schemeClr val="accent1">
+              <a:shade val="50000"/>
+            </a:schemeClr>
+          </a:lnRef>
+          <a:fillRef idx="1">
+            <a:schemeClr val="accent1"/>
+          </a:fillRef>
+          <a:effectRef idx="0">
+            <a:schemeClr val="accent1"/>
+          </a:effectRef>
+          <a:fontRef idx="minor">
+            <a:schemeClr val="lt1"/>
+          </a:fontRef>
+        </p:style>
+        <p:txBody>
+          <a:bodyPr rtlCol="0" anchor="ctr"/>
+          <a:lstStyle/>
+          <a:p>
+            <a:pPr algn="ctr"/>
+            <a:r>
+              <a:rPr lang="en-GB" sz="2400" dirty="0"/>
+              <a:t>4</a:t>
+            </a:r>
+            <a:endParaRPr lang="en-US" sz="2400" dirty="0"/>
+          </a:p>
+        </p:txBody>
+      </p:sp>
+    </p:spTree>
+    <p:extLst>
+      <p:ext uri="{BB962C8B-B14F-4D97-AF65-F5344CB8AC3E}">
+        <p14:creationId xmlns:p14="http://schemas.microsoft.com/office/powerpoint/2010/main" val="796373537"/>
+      </p:ext>
+    </p:extLst>
+  </p:cSld>
+  <p:clrMapOvr>
+    <a:masterClrMapping/>
+  </p:clrMapOvr>
+</p:sld>
+</file>
+
 <file path=ppt/theme/theme1.xml><?xml version="1.0" encoding="utf-8"?>
 <a:theme xmlns:a="http://schemas.openxmlformats.org/drawingml/2006/main" name="Office Theme">
   <a:themeElements>

</xml_diff>